<commit_message>
replaced PowerPoint presentation containing direction signs with a new version, were only the master slide contains the title and room number of the talk. For new talks, simply adjust the master slide an off you go.
</commit_message>
<xml_diff>
--- a/wegweiser/Wegweiser.pptx
+++ b/wegweiser/Wegweiser.pptx
@@ -146,6 +146,9 @@
             <a:off x="2738422" y="785794"/>
             <a:ext cx="5143536" cy="1470025"/>
           </a:xfrm>
+          <a:prstGeom prst="rect">
+            <a:avLst/>
+          </a:prstGeom>
         </p:spPr>
         <p:txBody>
           <a:bodyPr>
@@ -179,6 +182,9 @@
             <a:off x="738158" y="3643314"/>
             <a:ext cx="7072362" cy="2643206"/>
           </a:xfrm>
+          <a:prstGeom prst="rect">
+            <a:avLst/>
+          </a:prstGeom>
         </p:spPr>
         <p:txBody>
           <a:bodyPr>
@@ -403,7 +409,15 @@
             <p:ph type="title"/>
           </p:nvPr>
         </p:nvSpPr>
-        <p:spPr/>
+        <p:spPr>
+          <a:xfrm>
+            <a:off x="495300" y="274638"/>
+            <a:ext cx="8915400" cy="1143000"/>
+          </a:xfrm>
+          <a:prstGeom prst="rect">
+            <a:avLst/>
+          </a:prstGeom>
+        </p:spPr>
         <p:txBody>
           <a:bodyPr/>
           <a:lstStyle/>
@@ -426,7 +440,15 @@
             <p:ph type="body" orient="vert" idx="1"/>
           </p:nvPr>
         </p:nvSpPr>
-        <p:spPr/>
+        <p:spPr>
+          <a:xfrm>
+            <a:off x="495300" y="1600201"/>
+            <a:ext cx="8915400" cy="4525963"/>
+          </a:xfrm>
+          <a:prstGeom prst="rect">
+            <a:avLst/>
+          </a:prstGeom>
+        </p:spPr>
         <p:txBody>
           <a:bodyPr vert="eaVert"/>
           <a:lstStyle/>
@@ -478,14 +500,23 @@
             <p:ph type="dt" sz="half" idx="10"/>
           </p:nvPr>
         </p:nvSpPr>
-        <p:spPr/>
+        <p:spPr>
+          <a:xfrm>
+            <a:off x="495300" y="6356351"/>
+            <a:ext cx="2311400" cy="365125"/>
+          </a:xfrm>
+          <a:prstGeom prst="rect">
+            <a:avLst/>
+          </a:prstGeom>
+        </p:spPr>
         <p:txBody>
           <a:bodyPr/>
           <a:lstStyle/>
           <a:p>
             <a:fld id="{835DC513-C344-49AA-8AE7-00A196E93F3C}" type="datetimeFigureOut">
               <a:rPr lang="de-DE" smtClean="0"/>
-              <a:t>03.03.2011</a:t>
+              <a:pPr/>
+              <a:t>21.04.2011</a:t>
             </a:fld>
             <a:endParaRPr lang="de-DE"/>
           </a:p>
@@ -501,7 +532,15 @@
             <p:ph type="ftr" sz="quarter" idx="11"/>
           </p:nvPr>
         </p:nvSpPr>
-        <p:spPr/>
+        <p:spPr>
+          <a:xfrm>
+            <a:off x="3384550" y="6356351"/>
+            <a:ext cx="3136900" cy="365125"/>
+          </a:xfrm>
+          <a:prstGeom prst="rect">
+            <a:avLst/>
+          </a:prstGeom>
+        </p:spPr>
         <p:txBody>
           <a:bodyPr/>
           <a:lstStyle/>
@@ -520,13 +559,22 @@
             <p:ph type="sldNum" sz="quarter" idx="12"/>
           </p:nvPr>
         </p:nvSpPr>
-        <p:spPr/>
+        <p:spPr>
+          <a:xfrm>
+            <a:off x="7099300" y="6356351"/>
+            <a:ext cx="2311400" cy="365125"/>
+          </a:xfrm>
+          <a:prstGeom prst="rect">
+            <a:avLst/>
+          </a:prstGeom>
+        </p:spPr>
         <p:txBody>
           <a:bodyPr/>
           <a:lstStyle/>
           <a:p>
             <a:fld id="{4E0019F3-3029-4221-AB9C-3C43FBFDB166}" type="slidenum">
               <a:rPr lang="de-DE" smtClean="0"/>
+              <a:pPr/>
               <a:t>‹Nr.›</a:t>
             </a:fld>
             <a:endParaRPr lang="de-DE"/>
@@ -573,6 +621,9 @@
             <a:off x="7780337" y="274639"/>
             <a:ext cx="2414588" cy="5851525"/>
           </a:xfrm>
+          <a:prstGeom prst="rect">
+            <a:avLst/>
+          </a:prstGeom>
         </p:spPr>
         <p:txBody>
           <a:bodyPr vert="eaVert"/>
@@ -601,6 +652,9 @@
             <a:off x="536575" y="274639"/>
             <a:ext cx="7078663" cy="5851525"/>
           </a:xfrm>
+          <a:prstGeom prst="rect">
+            <a:avLst/>
+          </a:prstGeom>
         </p:spPr>
         <p:txBody>
           <a:bodyPr vert="eaVert"/>
@@ -653,14 +707,23 @@
             <p:ph type="dt" sz="half" idx="10"/>
           </p:nvPr>
         </p:nvSpPr>
-        <p:spPr/>
+        <p:spPr>
+          <a:xfrm>
+            <a:off x="495300" y="6356351"/>
+            <a:ext cx="2311400" cy="365125"/>
+          </a:xfrm>
+          <a:prstGeom prst="rect">
+            <a:avLst/>
+          </a:prstGeom>
+        </p:spPr>
         <p:txBody>
           <a:bodyPr/>
           <a:lstStyle/>
           <a:p>
             <a:fld id="{835DC513-C344-49AA-8AE7-00A196E93F3C}" type="datetimeFigureOut">
               <a:rPr lang="de-DE" smtClean="0"/>
-              <a:t>03.03.2011</a:t>
+              <a:pPr/>
+              <a:t>21.04.2011</a:t>
             </a:fld>
             <a:endParaRPr lang="de-DE"/>
           </a:p>
@@ -676,7 +739,15 @@
             <p:ph type="ftr" sz="quarter" idx="11"/>
           </p:nvPr>
         </p:nvSpPr>
-        <p:spPr/>
+        <p:spPr>
+          <a:xfrm>
+            <a:off x="3384550" y="6356351"/>
+            <a:ext cx="3136900" cy="365125"/>
+          </a:xfrm>
+          <a:prstGeom prst="rect">
+            <a:avLst/>
+          </a:prstGeom>
+        </p:spPr>
         <p:txBody>
           <a:bodyPr/>
           <a:lstStyle/>
@@ -695,13 +766,22 @@
             <p:ph type="sldNum" sz="quarter" idx="12"/>
           </p:nvPr>
         </p:nvSpPr>
-        <p:spPr/>
+        <p:spPr>
+          <a:xfrm>
+            <a:off x="7099300" y="6356351"/>
+            <a:ext cx="2311400" cy="365125"/>
+          </a:xfrm>
+          <a:prstGeom prst="rect">
+            <a:avLst/>
+          </a:prstGeom>
+        </p:spPr>
         <p:txBody>
           <a:bodyPr/>
           <a:lstStyle/>
           <a:p>
             <a:fld id="{4E0019F3-3029-4221-AB9C-3C43FBFDB166}" type="slidenum">
               <a:rPr lang="de-DE" smtClean="0"/>
+              <a:pPr/>
               <a:t>‹Nr.›</a:t>
             </a:fld>
             <a:endParaRPr lang="de-DE"/>
@@ -897,7 +977,8 @@
           <a:p>
             <a:fld id="{0E4C24D9-47E7-4B51-AC88-546B4AA38802}" type="datetimeFigureOut">
               <a:rPr lang="de-DE" smtClean="0"/>
-              <a:t>03.03.2011</a:t>
+              <a:pPr/>
+              <a:t>21.04.2011</a:t>
             </a:fld>
             <a:endParaRPr lang="de-DE"/>
           </a:p>
@@ -939,6 +1020,7 @@
           <a:p>
             <a:fld id="{BB3CE0FA-406E-42B9-A445-953C2CC35DD4}" type="slidenum">
               <a:rPr lang="de-DE" smtClean="0"/>
+              <a:pPr/>
               <a:t>‹Nr.›</a:t>
             </a:fld>
             <a:endParaRPr lang="de-DE"/>
@@ -1062,7 +1144,8 @@
           <a:p>
             <a:fld id="{0E4C24D9-47E7-4B51-AC88-546B4AA38802}" type="datetimeFigureOut">
               <a:rPr lang="de-DE" smtClean="0"/>
-              <a:t>03.03.2011</a:t>
+              <a:pPr/>
+              <a:t>21.04.2011</a:t>
             </a:fld>
             <a:endParaRPr lang="de-DE"/>
           </a:p>
@@ -1104,6 +1187,7 @@
           <a:p>
             <a:fld id="{BB3CE0FA-406E-42B9-A445-953C2CC35DD4}" type="slidenum">
               <a:rPr lang="de-DE" smtClean="0"/>
+              <a:pPr/>
               <a:t>‹Nr.›</a:t>
             </a:fld>
             <a:endParaRPr lang="de-DE"/>
@@ -1303,7 +1387,8 @@
           <a:p>
             <a:fld id="{0E4C24D9-47E7-4B51-AC88-546B4AA38802}" type="datetimeFigureOut">
               <a:rPr lang="de-DE" smtClean="0"/>
-              <a:t>03.03.2011</a:t>
+              <a:pPr/>
+              <a:t>21.04.2011</a:t>
             </a:fld>
             <a:endParaRPr lang="de-DE"/>
           </a:p>
@@ -1345,6 +1430,7 @@
           <a:p>
             <a:fld id="{BB3CE0FA-406E-42B9-A445-953C2CC35DD4}" type="slidenum">
               <a:rPr lang="de-DE" smtClean="0"/>
+              <a:pPr/>
               <a:t>‹Nr.›</a:t>
             </a:fld>
             <a:endParaRPr lang="de-DE"/>
@@ -1586,7 +1672,8 @@
           <a:p>
             <a:fld id="{0E4C24D9-47E7-4B51-AC88-546B4AA38802}" type="datetimeFigureOut">
               <a:rPr lang="de-DE" smtClean="0"/>
-              <a:t>03.03.2011</a:t>
+              <a:pPr/>
+              <a:t>21.04.2011</a:t>
             </a:fld>
             <a:endParaRPr lang="de-DE"/>
           </a:p>
@@ -1628,6 +1715,7 @@
           <a:p>
             <a:fld id="{BB3CE0FA-406E-42B9-A445-953C2CC35DD4}" type="slidenum">
               <a:rPr lang="de-DE" smtClean="0"/>
+              <a:pPr/>
               <a:t>‹Nr.›</a:t>
             </a:fld>
             <a:endParaRPr lang="de-DE"/>
@@ -2003,7 +2091,8 @@
           <a:p>
             <a:fld id="{0E4C24D9-47E7-4B51-AC88-546B4AA38802}" type="datetimeFigureOut">
               <a:rPr lang="de-DE" smtClean="0"/>
-              <a:t>03.03.2011</a:t>
+              <a:pPr/>
+              <a:t>21.04.2011</a:t>
             </a:fld>
             <a:endParaRPr lang="de-DE"/>
           </a:p>
@@ -2045,6 +2134,7 @@
           <a:p>
             <a:fld id="{BB3CE0FA-406E-42B9-A445-953C2CC35DD4}" type="slidenum">
               <a:rPr lang="de-DE" smtClean="0"/>
+              <a:pPr/>
               <a:t>‹Nr.›</a:t>
             </a:fld>
             <a:endParaRPr lang="de-DE"/>
@@ -2116,7 +2206,8 @@
           <a:p>
             <a:fld id="{0E4C24D9-47E7-4B51-AC88-546B4AA38802}" type="datetimeFigureOut">
               <a:rPr lang="de-DE" smtClean="0"/>
-              <a:t>03.03.2011</a:t>
+              <a:pPr/>
+              <a:t>21.04.2011</a:t>
             </a:fld>
             <a:endParaRPr lang="de-DE"/>
           </a:p>
@@ -2158,6 +2249,7 @@
           <a:p>
             <a:fld id="{BB3CE0FA-406E-42B9-A445-953C2CC35DD4}" type="slidenum">
               <a:rPr lang="de-DE" smtClean="0"/>
+              <a:pPr/>
               <a:t>‹Nr.›</a:t>
             </a:fld>
             <a:endParaRPr lang="de-DE"/>
@@ -2206,7 +2298,8 @@
           <a:p>
             <a:fld id="{0E4C24D9-47E7-4B51-AC88-546B4AA38802}" type="datetimeFigureOut">
               <a:rPr lang="de-DE" smtClean="0"/>
-              <a:t>03.03.2011</a:t>
+              <a:pPr/>
+              <a:t>21.04.2011</a:t>
             </a:fld>
             <a:endParaRPr lang="de-DE"/>
           </a:p>
@@ -2248,6 +2341,7 @@
           <a:p>
             <a:fld id="{BB3CE0FA-406E-42B9-A445-953C2CC35DD4}" type="slidenum">
               <a:rPr lang="de-DE" smtClean="0"/>
+              <a:pPr/>
               <a:t>‹Nr.›</a:t>
             </a:fld>
             <a:endParaRPr lang="de-DE"/>
@@ -2478,7 +2572,8 @@
           <a:p>
             <a:fld id="{0E4C24D9-47E7-4B51-AC88-546B4AA38802}" type="datetimeFigureOut">
               <a:rPr lang="de-DE" smtClean="0"/>
-              <a:t>03.03.2011</a:t>
+              <a:pPr/>
+              <a:t>21.04.2011</a:t>
             </a:fld>
             <a:endParaRPr lang="de-DE"/>
           </a:p>
@@ -2520,6 +2615,7 @@
           <a:p>
             <a:fld id="{BB3CE0FA-406E-42B9-A445-953C2CC35DD4}" type="slidenum">
               <a:rPr lang="de-DE" smtClean="0"/>
+              <a:pPr/>
               <a:t>‹Nr.›</a:t>
             </a:fld>
             <a:endParaRPr lang="de-DE"/>
@@ -2561,7 +2657,15 @@
             <p:ph type="title"/>
           </p:nvPr>
         </p:nvSpPr>
-        <p:spPr/>
+        <p:spPr>
+          <a:xfrm>
+            <a:off x="495300" y="274638"/>
+            <a:ext cx="8915400" cy="1143000"/>
+          </a:xfrm>
+          <a:prstGeom prst="rect">
+            <a:avLst/>
+          </a:prstGeom>
+        </p:spPr>
         <p:txBody>
           <a:bodyPr/>
           <a:lstStyle/>
@@ -2584,7 +2688,15 @@
             <p:ph idx="1"/>
           </p:nvPr>
         </p:nvSpPr>
-        <p:spPr/>
+        <p:spPr>
+          <a:xfrm>
+            <a:off x="495300" y="1600201"/>
+            <a:ext cx="8915400" cy="4525963"/>
+          </a:xfrm>
+          <a:prstGeom prst="rect">
+            <a:avLst/>
+          </a:prstGeom>
+        </p:spPr>
         <p:txBody>
           <a:bodyPr/>
           <a:lstStyle/>
@@ -2636,14 +2748,23 @@
             <p:ph type="dt" sz="half" idx="10"/>
           </p:nvPr>
         </p:nvSpPr>
-        <p:spPr/>
+        <p:spPr>
+          <a:xfrm>
+            <a:off x="495300" y="6356351"/>
+            <a:ext cx="2311400" cy="365125"/>
+          </a:xfrm>
+          <a:prstGeom prst="rect">
+            <a:avLst/>
+          </a:prstGeom>
+        </p:spPr>
         <p:txBody>
           <a:bodyPr/>
           <a:lstStyle/>
           <a:p>
             <a:fld id="{835DC513-C344-49AA-8AE7-00A196E93F3C}" type="datetimeFigureOut">
               <a:rPr lang="de-DE" smtClean="0"/>
-              <a:t>03.03.2011</a:t>
+              <a:pPr/>
+              <a:t>21.04.2011</a:t>
             </a:fld>
             <a:endParaRPr lang="de-DE"/>
           </a:p>
@@ -2659,7 +2780,15 @@
             <p:ph type="ftr" sz="quarter" idx="11"/>
           </p:nvPr>
         </p:nvSpPr>
-        <p:spPr/>
+        <p:spPr>
+          <a:xfrm>
+            <a:off x="3384550" y="6356351"/>
+            <a:ext cx="3136900" cy="365125"/>
+          </a:xfrm>
+          <a:prstGeom prst="rect">
+            <a:avLst/>
+          </a:prstGeom>
+        </p:spPr>
         <p:txBody>
           <a:bodyPr/>
           <a:lstStyle/>
@@ -2678,13 +2807,22 @@
             <p:ph type="sldNum" sz="quarter" idx="12"/>
           </p:nvPr>
         </p:nvSpPr>
-        <p:spPr/>
+        <p:spPr>
+          <a:xfrm>
+            <a:off x="7099300" y="6356351"/>
+            <a:ext cx="2311400" cy="365125"/>
+          </a:xfrm>
+          <a:prstGeom prst="rect">
+            <a:avLst/>
+          </a:prstGeom>
+        </p:spPr>
         <p:txBody>
           <a:bodyPr/>
           <a:lstStyle/>
           <a:p>
             <a:fld id="{4E0019F3-3029-4221-AB9C-3C43FBFDB166}" type="slidenum">
               <a:rPr lang="de-DE" smtClean="0"/>
+              <a:pPr/>
               <a:t>‹Nr.›</a:t>
             </a:fld>
             <a:endParaRPr lang="de-DE"/>
@@ -2891,7 +3029,8 @@
           <a:p>
             <a:fld id="{0E4C24D9-47E7-4B51-AC88-546B4AA38802}" type="datetimeFigureOut">
               <a:rPr lang="de-DE" smtClean="0"/>
-              <a:t>03.03.2011</a:t>
+              <a:pPr/>
+              <a:t>21.04.2011</a:t>
             </a:fld>
             <a:endParaRPr lang="de-DE"/>
           </a:p>
@@ -2933,6 +3072,7 @@
           <a:p>
             <a:fld id="{BB3CE0FA-406E-42B9-A445-953C2CC35DD4}" type="slidenum">
               <a:rPr lang="de-DE" smtClean="0"/>
+              <a:pPr/>
               <a:t>‹Nr.›</a:t>
             </a:fld>
             <a:endParaRPr lang="de-DE"/>
@@ -3056,7 +3196,8 @@
           <a:p>
             <a:fld id="{0E4C24D9-47E7-4B51-AC88-546B4AA38802}" type="datetimeFigureOut">
               <a:rPr lang="de-DE" smtClean="0"/>
-              <a:t>03.03.2011</a:t>
+              <a:pPr/>
+              <a:t>21.04.2011</a:t>
             </a:fld>
             <a:endParaRPr lang="de-DE"/>
           </a:p>
@@ -3098,6 +3239,7 @@
           <a:p>
             <a:fld id="{BB3CE0FA-406E-42B9-A445-953C2CC35DD4}" type="slidenum">
               <a:rPr lang="de-DE" smtClean="0"/>
+              <a:pPr/>
               <a:t>‹Nr.›</a:t>
             </a:fld>
             <a:endParaRPr lang="de-DE"/>
@@ -3231,7 +3373,8 @@
           <a:p>
             <a:fld id="{0E4C24D9-47E7-4B51-AC88-546B4AA38802}" type="datetimeFigureOut">
               <a:rPr lang="de-DE" smtClean="0"/>
-              <a:t>03.03.2011</a:t>
+              <a:pPr/>
+              <a:t>21.04.2011</a:t>
             </a:fld>
             <a:endParaRPr lang="de-DE"/>
           </a:p>
@@ -3273,6 +3416,7 @@
           <a:p>
             <a:fld id="{BB3CE0FA-406E-42B9-A445-953C2CC35DD4}" type="slidenum">
               <a:rPr lang="de-DE" smtClean="0"/>
+              <a:pPr/>
               <a:t>‹Nr.›</a:t>
             </a:fld>
             <a:endParaRPr lang="de-DE"/>
@@ -3319,6 +3463,9 @@
             <a:off x="782506" y="4406901"/>
             <a:ext cx="8420100" cy="1362075"/>
           </a:xfrm>
+          <a:prstGeom prst="rect">
+            <a:avLst/>
+          </a:prstGeom>
         </p:spPr>
         <p:txBody>
           <a:bodyPr anchor="t"/>
@@ -3351,6 +3498,9 @@
             <a:off x="782506" y="2906713"/>
             <a:ext cx="8420100" cy="1500187"/>
           </a:xfrm>
+          <a:prstGeom prst="rect">
+            <a:avLst/>
+          </a:prstGeom>
         </p:spPr>
         <p:txBody>
           <a:bodyPr anchor="b"/>
@@ -3465,14 +3615,23 @@
             <p:ph type="dt" sz="half" idx="10"/>
           </p:nvPr>
         </p:nvSpPr>
-        <p:spPr/>
+        <p:spPr>
+          <a:xfrm>
+            <a:off x="495300" y="6356351"/>
+            <a:ext cx="2311400" cy="365125"/>
+          </a:xfrm>
+          <a:prstGeom prst="rect">
+            <a:avLst/>
+          </a:prstGeom>
+        </p:spPr>
         <p:txBody>
           <a:bodyPr/>
           <a:lstStyle/>
           <a:p>
             <a:fld id="{835DC513-C344-49AA-8AE7-00A196E93F3C}" type="datetimeFigureOut">
               <a:rPr lang="de-DE" smtClean="0"/>
-              <a:t>03.03.2011</a:t>
+              <a:pPr/>
+              <a:t>21.04.2011</a:t>
             </a:fld>
             <a:endParaRPr lang="de-DE"/>
           </a:p>
@@ -3488,7 +3647,15 @@
             <p:ph type="ftr" sz="quarter" idx="11"/>
           </p:nvPr>
         </p:nvSpPr>
-        <p:spPr/>
+        <p:spPr>
+          <a:xfrm>
+            <a:off x="3384550" y="6356351"/>
+            <a:ext cx="3136900" cy="365125"/>
+          </a:xfrm>
+          <a:prstGeom prst="rect">
+            <a:avLst/>
+          </a:prstGeom>
+        </p:spPr>
         <p:txBody>
           <a:bodyPr/>
           <a:lstStyle/>
@@ -3507,13 +3674,22 @@
             <p:ph type="sldNum" sz="quarter" idx="12"/>
           </p:nvPr>
         </p:nvSpPr>
-        <p:spPr/>
+        <p:spPr>
+          <a:xfrm>
+            <a:off x="7099300" y="6356351"/>
+            <a:ext cx="2311400" cy="365125"/>
+          </a:xfrm>
+          <a:prstGeom prst="rect">
+            <a:avLst/>
+          </a:prstGeom>
+        </p:spPr>
         <p:txBody>
           <a:bodyPr/>
           <a:lstStyle/>
           <a:p>
             <a:fld id="{4E0019F3-3029-4221-AB9C-3C43FBFDB166}" type="slidenum">
               <a:rPr lang="de-DE" smtClean="0"/>
+              <a:pPr/>
               <a:t>‹Nr.›</a:t>
             </a:fld>
             <a:endParaRPr lang="de-DE"/>
@@ -3555,7 +3731,15 @@
             <p:ph type="title"/>
           </p:nvPr>
         </p:nvSpPr>
-        <p:spPr/>
+        <p:spPr>
+          <a:xfrm>
+            <a:off x="495300" y="274638"/>
+            <a:ext cx="8915400" cy="1143000"/>
+          </a:xfrm>
+          <a:prstGeom prst="rect">
+            <a:avLst/>
+          </a:prstGeom>
+        </p:spPr>
         <p:txBody>
           <a:bodyPr/>
           <a:lstStyle/>
@@ -3583,6 +3767,9 @@
             <a:off x="536575" y="1600201"/>
             <a:ext cx="4746625" cy="4525963"/>
           </a:xfrm>
+          <a:prstGeom prst="rect">
+            <a:avLst/>
+          </a:prstGeom>
         </p:spPr>
         <p:txBody>
           <a:bodyPr/>
@@ -3668,6 +3855,9 @@
             <a:off x="5448300" y="1600201"/>
             <a:ext cx="4746625" cy="4525963"/>
           </a:xfrm>
+          <a:prstGeom prst="rect">
+            <a:avLst/>
+          </a:prstGeom>
         </p:spPr>
         <p:txBody>
           <a:bodyPr/>
@@ -3748,14 +3938,23 @@
             <p:ph type="dt" sz="half" idx="10"/>
           </p:nvPr>
         </p:nvSpPr>
-        <p:spPr/>
+        <p:spPr>
+          <a:xfrm>
+            <a:off x="495300" y="6356351"/>
+            <a:ext cx="2311400" cy="365125"/>
+          </a:xfrm>
+          <a:prstGeom prst="rect">
+            <a:avLst/>
+          </a:prstGeom>
+        </p:spPr>
         <p:txBody>
           <a:bodyPr/>
           <a:lstStyle/>
           <a:p>
             <a:fld id="{835DC513-C344-49AA-8AE7-00A196E93F3C}" type="datetimeFigureOut">
               <a:rPr lang="de-DE" smtClean="0"/>
-              <a:t>03.03.2011</a:t>
+              <a:pPr/>
+              <a:t>21.04.2011</a:t>
             </a:fld>
             <a:endParaRPr lang="de-DE"/>
           </a:p>
@@ -3771,7 +3970,15 @@
             <p:ph type="ftr" sz="quarter" idx="11"/>
           </p:nvPr>
         </p:nvSpPr>
-        <p:spPr/>
+        <p:spPr>
+          <a:xfrm>
+            <a:off x="3384550" y="6356351"/>
+            <a:ext cx="3136900" cy="365125"/>
+          </a:xfrm>
+          <a:prstGeom prst="rect">
+            <a:avLst/>
+          </a:prstGeom>
+        </p:spPr>
         <p:txBody>
           <a:bodyPr/>
           <a:lstStyle/>
@@ -3790,13 +3997,22 @@
             <p:ph type="sldNum" sz="quarter" idx="12"/>
           </p:nvPr>
         </p:nvSpPr>
-        <p:spPr/>
+        <p:spPr>
+          <a:xfrm>
+            <a:off x="7099300" y="6356351"/>
+            <a:ext cx="2311400" cy="365125"/>
+          </a:xfrm>
+          <a:prstGeom prst="rect">
+            <a:avLst/>
+          </a:prstGeom>
+        </p:spPr>
         <p:txBody>
           <a:bodyPr/>
           <a:lstStyle/>
           <a:p>
             <a:fld id="{4E0019F3-3029-4221-AB9C-3C43FBFDB166}" type="slidenum">
               <a:rPr lang="de-DE" smtClean="0"/>
+              <a:pPr/>
               <a:t>‹Nr.›</a:t>
             </a:fld>
             <a:endParaRPr lang="de-DE"/>
@@ -3843,6 +4059,9 @@
             <a:off x="495300" y="274638"/>
             <a:ext cx="8915400" cy="1143000"/>
           </a:xfrm>
+          <a:prstGeom prst="rect">
+            <a:avLst/>
+          </a:prstGeom>
         </p:spPr>
         <p:txBody>
           <a:bodyPr/>
@@ -3875,6 +4094,9 @@
             <a:off x="495300" y="1535113"/>
             <a:ext cx="4376870" cy="639762"/>
           </a:xfrm>
+          <a:prstGeom prst="rect">
+            <a:avLst/>
+          </a:prstGeom>
         </p:spPr>
         <p:txBody>
           <a:bodyPr anchor="b"/>
@@ -3940,6 +4162,9 @@
             <a:off x="495300" y="2174875"/>
             <a:ext cx="4376870" cy="3951288"/>
           </a:xfrm>
+          <a:prstGeom prst="rect">
+            <a:avLst/>
+          </a:prstGeom>
         </p:spPr>
         <p:txBody>
           <a:bodyPr/>
@@ -4025,6 +4250,9 @@
             <a:off x="5032111" y="1535113"/>
             <a:ext cx="4378590" cy="639762"/>
           </a:xfrm>
+          <a:prstGeom prst="rect">
+            <a:avLst/>
+          </a:prstGeom>
         </p:spPr>
         <p:txBody>
           <a:bodyPr anchor="b"/>
@@ -4090,6 +4318,9 @@
             <a:off x="5032111" y="2174875"/>
             <a:ext cx="4378590" cy="3951288"/>
           </a:xfrm>
+          <a:prstGeom prst="rect">
+            <a:avLst/>
+          </a:prstGeom>
         </p:spPr>
         <p:txBody>
           <a:bodyPr/>
@@ -4170,14 +4401,23 @@
             <p:ph type="dt" sz="half" idx="10"/>
           </p:nvPr>
         </p:nvSpPr>
-        <p:spPr/>
+        <p:spPr>
+          <a:xfrm>
+            <a:off x="495300" y="6356351"/>
+            <a:ext cx="2311400" cy="365125"/>
+          </a:xfrm>
+          <a:prstGeom prst="rect">
+            <a:avLst/>
+          </a:prstGeom>
+        </p:spPr>
         <p:txBody>
           <a:bodyPr/>
           <a:lstStyle/>
           <a:p>
             <a:fld id="{835DC513-C344-49AA-8AE7-00A196E93F3C}" type="datetimeFigureOut">
               <a:rPr lang="de-DE" smtClean="0"/>
-              <a:t>03.03.2011</a:t>
+              <a:pPr/>
+              <a:t>21.04.2011</a:t>
             </a:fld>
             <a:endParaRPr lang="de-DE"/>
           </a:p>
@@ -4193,7 +4433,15 @@
             <p:ph type="ftr" sz="quarter" idx="11"/>
           </p:nvPr>
         </p:nvSpPr>
-        <p:spPr/>
+        <p:spPr>
+          <a:xfrm>
+            <a:off x="3384550" y="6356351"/>
+            <a:ext cx="3136900" cy="365125"/>
+          </a:xfrm>
+          <a:prstGeom prst="rect">
+            <a:avLst/>
+          </a:prstGeom>
+        </p:spPr>
         <p:txBody>
           <a:bodyPr/>
           <a:lstStyle/>
@@ -4212,13 +4460,22 @@
             <p:ph type="sldNum" sz="quarter" idx="12"/>
           </p:nvPr>
         </p:nvSpPr>
-        <p:spPr/>
+        <p:spPr>
+          <a:xfrm>
+            <a:off x="7099300" y="6356351"/>
+            <a:ext cx="2311400" cy="365125"/>
+          </a:xfrm>
+          <a:prstGeom prst="rect">
+            <a:avLst/>
+          </a:prstGeom>
+        </p:spPr>
         <p:txBody>
           <a:bodyPr/>
           <a:lstStyle/>
           <a:p>
             <a:fld id="{4E0019F3-3029-4221-AB9C-3C43FBFDB166}" type="slidenum">
               <a:rPr lang="de-DE" smtClean="0"/>
+              <a:pPr/>
               <a:t>‹Nr.›</a:t>
             </a:fld>
             <a:endParaRPr lang="de-DE"/>
@@ -4260,7 +4517,15 @@
             <p:ph type="title"/>
           </p:nvPr>
         </p:nvSpPr>
-        <p:spPr/>
+        <p:spPr>
+          <a:xfrm>
+            <a:off x="495300" y="274638"/>
+            <a:ext cx="8915400" cy="1143000"/>
+          </a:xfrm>
+          <a:prstGeom prst="rect">
+            <a:avLst/>
+          </a:prstGeom>
+        </p:spPr>
         <p:txBody>
           <a:bodyPr/>
           <a:lstStyle/>
@@ -4283,14 +4548,23 @@
             <p:ph type="dt" sz="half" idx="10"/>
           </p:nvPr>
         </p:nvSpPr>
-        <p:spPr/>
+        <p:spPr>
+          <a:xfrm>
+            <a:off x="495300" y="6356351"/>
+            <a:ext cx="2311400" cy="365125"/>
+          </a:xfrm>
+          <a:prstGeom prst="rect">
+            <a:avLst/>
+          </a:prstGeom>
+        </p:spPr>
         <p:txBody>
           <a:bodyPr/>
           <a:lstStyle/>
           <a:p>
             <a:fld id="{835DC513-C344-49AA-8AE7-00A196E93F3C}" type="datetimeFigureOut">
               <a:rPr lang="de-DE" smtClean="0"/>
-              <a:t>03.03.2011</a:t>
+              <a:pPr/>
+              <a:t>21.04.2011</a:t>
             </a:fld>
             <a:endParaRPr lang="de-DE"/>
           </a:p>
@@ -4306,7 +4580,15 @@
             <p:ph type="ftr" sz="quarter" idx="11"/>
           </p:nvPr>
         </p:nvSpPr>
-        <p:spPr/>
+        <p:spPr>
+          <a:xfrm>
+            <a:off x="3384550" y="6356351"/>
+            <a:ext cx="3136900" cy="365125"/>
+          </a:xfrm>
+          <a:prstGeom prst="rect">
+            <a:avLst/>
+          </a:prstGeom>
+        </p:spPr>
         <p:txBody>
           <a:bodyPr/>
           <a:lstStyle/>
@@ -4325,13 +4607,22 @@
             <p:ph type="sldNum" sz="quarter" idx="12"/>
           </p:nvPr>
         </p:nvSpPr>
-        <p:spPr/>
+        <p:spPr>
+          <a:xfrm>
+            <a:off x="7099300" y="6356351"/>
+            <a:ext cx="2311400" cy="365125"/>
+          </a:xfrm>
+          <a:prstGeom prst="rect">
+            <a:avLst/>
+          </a:prstGeom>
+        </p:spPr>
         <p:txBody>
           <a:bodyPr/>
           <a:lstStyle/>
           <a:p>
             <a:fld id="{4E0019F3-3029-4221-AB9C-3C43FBFDB166}" type="slidenum">
               <a:rPr lang="de-DE" smtClean="0"/>
+              <a:pPr/>
               <a:t>‹Nr.›</a:t>
             </a:fld>
             <a:endParaRPr lang="de-DE"/>
@@ -4373,14 +4664,23 @@
             <p:ph type="dt" sz="half" idx="10"/>
           </p:nvPr>
         </p:nvSpPr>
-        <p:spPr/>
+        <p:spPr>
+          <a:xfrm>
+            <a:off x="495300" y="6356351"/>
+            <a:ext cx="2311400" cy="365125"/>
+          </a:xfrm>
+          <a:prstGeom prst="rect">
+            <a:avLst/>
+          </a:prstGeom>
+        </p:spPr>
         <p:txBody>
           <a:bodyPr/>
           <a:lstStyle/>
           <a:p>
             <a:fld id="{835DC513-C344-49AA-8AE7-00A196E93F3C}" type="datetimeFigureOut">
               <a:rPr lang="de-DE" smtClean="0"/>
-              <a:t>03.03.2011</a:t>
+              <a:pPr/>
+              <a:t>21.04.2011</a:t>
             </a:fld>
             <a:endParaRPr lang="de-DE"/>
           </a:p>
@@ -4396,7 +4696,15 @@
             <p:ph type="ftr" sz="quarter" idx="11"/>
           </p:nvPr>
         </p:nvSpPr>
-        <p:spPr/>
+        <p:spPr>
+          <a:xfrm>
+            <a:off x="3384550" y="6356351"/>
+            <a:ext cx="3136900" cy="365125"/>
+          </a:xfrm>
+          <a:prstGeom prst="rect">
+            <a:avLst/>
+          </a:prstGeom>
+        </p:spPr>
         <p:txBody>
           <a:bodyPr/>
           <a:lstStyle/>
@@ -4415,13 +4723,22 @@
             <p:ph type="sldNum" sz="quarter" idx="12"/>
           </p:nvPr>
         </p:nvSpPr>
-        <p:spPr/>
+        <p:spPr>
+          <a:xfrm>
+            <a:off x="7099300" y="6356351"/>
+            <a:ext cx="2311400" cy="365125"/>
+          </a:xfrm>
+          <a:prstGeom prst="rect">
+            <a:avLst/>
+          </a:prstGeom>
+        </p:spPr>
         <p:txBody>
           <a:bodyPr/>
           <a:lstStyle/>
           <a:p>
             <a:fld id="{4E0019F3-3029-4221-AB9C-3C43FBFDB166}" type="slidenum">
               <a:rPr lang="de-DE" smtClean="0"/>
+              <a:pPr/>
               <a:t>‹Nr.›</a:t>
             </a:fld>
             <a:endParaRPr lang="de-DE"/>
@@ -4468,6 +4785,9 @@
             <a:off x="495300" y="273050"/>
             <a:ext cx="3259006" cy="1162050"/>
           </a:xfrm>
+          <a:prstGeom prst="rect">
+            <a:avLst/>
+          </a:prstGeom>
         </p:spPr>
         <p:txBody>
           <a:bodyPr anchor="b"/>
@@ -4500,6 +4820,9 @@
             <a:off x="3872971" y="273051"/>
             <a:ext cx="5537729" cy="5853113"/>
           </a:xfrm>
+          <a:prstGeom prst="rect">
+            <a:avLst/>
+          </a:prstGeom>
         </p:spPr>
         <p:txBody>
           <a:bodyPr/>
@@ -4585,6 +4908,9 @@
             <a:off x="495300" y="1435101"/>
             <a:ext cx="3259006" cy="4691063"/>
           </a:xfrm>
+          <a:prstGeom prst="rect">
+            <a:avLst/>
+          </a:prstGeom>
         </p:spPr>
         <p:txBody>
           <a:bodyPr/>
@@ -4645,14 +4971,23 @@
             <p:ph type="dt" sz="half" idx="10"/>
           </p:nvPr>
         </p:nvSpPr>
-        <p:spPr/>
+        <p:spPr>
+          <a:xfrm>
+            <a:off x="495300" y="6356351"/>
+            <a:ext cx="2311400" cy="365125"/>
+          </a:xfrm>
+          <a:prstGeom prst="rect">
+            <a:avLst/>
+          </a:prstGeom>
+        </p:spPr>
         <p:txBody>
           <a:bodyPr/>
           <a:lstStyle/>
           <a:p>
             <a:fld id="{835DC513-C344-49AA-8AE7-00A196E93F3C}" type="datetimeFigureOut">
               <a:rPr lang="de-DE" smtClean="0"/>
-              <a:t>03.03.2011</a:t>
+              <a:pPr/>
+              <a:t>21.04.2011</a:t>
             </a:fld>
             <a:endParaRPr lang="de-DE"/>
           </a:p>
@@ -4668,7 +5003,15 @@
             <p:ph type="ftr" sz="quarter" idx="11"/>
           </p:nvPr>
         </p:nvSpPr>
-        <p:spPr/>
+        <p:spPr>
+          <a:xfrm>
+            <a:off x="3384550" y="6356351"/>
+            <a:ext cx="3136900" cy="365125"/>
+          </a:xfrm>
+          <a:prstGeom prst="rect">
+            <a:avLst/>
+          </a:prstGeom>
+        </p:spPr>
         <p:txBody>
           <a:bodyPr/>
           <a:lstStyle/>
@@ -4687,13 +5030,22 @@
             <p:ph type="sldNum" sz="quarter" idx="12"/>
           </p:nvPr>
         </p:nvSpPr>
-        <p:spPr/>
+        <p:spPr>
+          <a:xfrm>
+            <a:off x="7099300" y="6356351"/>
+            <a:ext cx="2311400" cy="365125"/>
+          </a:xfrm>
+          <a:prstGeom prst="rect">
+            <a:avLst/>
+          </a:prstGeom>
+        </p:spPr>
         <p:txBody>
           <a:bodyPr/>
           <a:lstStyle/>
           <a:p>
             <a:fld id="{4E0019F3-3029-4221-AB9C-3C43FBFDB166}" type="slidenum">
               <a:rPr lang="de-DE" smtClean="0"/>
+              <a:pPr/>
               <a:t>‹Nr.›</a:t>
             </a:fld>
             <a:endParaRPr lang="de-DE"/>
@@ -4740,6 +5092,9 @@
             <a:off x="1941645" y="4800600"/>
             <a:ext cx="5943600" cy="566738"/>
           </a:xfrm>
+          <a:prstGeom prst="rect">
+            <a:avLst/>
+          </a:prstGeom>
         </p:spPr>
         <p:txBody>
           <a:bodyPr anchor="b"/>
@@ -4772,6 +5127,9 @@
             <a:off x="1941645" y="612775"/>
             <a:ext cx="5943600" cy="4114800"/>
           </a:xfrm>
+          <a:prstGeom prst="rect">
+            <a:avLst/>
+          </a:prstGeom>
         </p:spPr>
         <p:txBody>
           <a:bodyPr/>
@@ -4833,6 +5191,9 @@
             <a:off x="1941645" y="5367338"/>
             <a:ext cx="5943600" cy="804862"/>
           </a:xfrm>
+          <a:prstGeom prst="rect">
+            <a:avLst/>
+          </a:prstGeom>
         </p:spPr>
         <p:txBody>
           <a:bodyPr/>
@@ -4893,14 +5254,23 @@
             <p:ph type="dt" sz="half" idx="10"/>
           </p:nvPr>
         </p:nvSpPr>
-        <p:spPr/>
+        <p:spPr>
+          <a:xfrm>
+            <a:off x="495300" y="6356351"/>
+            <a:ext cx="2311400" cy="365125"/>
+          </a:xfrm>
+          <a:prstGeom prst="rect">
+            <a:avLst/>
+          </a:prstGeom>
+        </p:spPr>
         <p:txBody>
           <a:bodyPr/>
           <a:lstStyle/>
           <a:p>
             <a:fld id="{835DC513-C344-49AA-8AE7-00A196E93F3C}" type="datetimeFigureOut">
               <a:rPr lang="de-DE" smtClean="0"/>
-              <a:t>03.03.2011</a:t>
+              <a:pPr/>
+              <a:t>21.04.2011</a:t>
             </a:fld>
             <a:endParaRPr lang="de-DE"/>
           </a:p>
@@ -4916,7 +5286,15 @@
             <p:ph type="ftr" sz="quarter" idx="11"/>
           </p:nvPr>
         </p:nvSpPr>
-        <p:spPr/>
+        <p:spPr>
+          <a:xfrm>
+            <a:off x="3384550" y="6356351"/>
+            <a:ext cx="3136900" cy="365125"/>
+          </a:xfrm>
+          <a:prstGeom prst="rect">
+            <a:avLst/>
+          </a:prstGeom>
+        </p:spPr>
         <p:txBody>
           <a:bodyPr/>
           <a:lstStyle/>
@@ -4935,13 +5313,22 @@
             <p:ph type="sldNum" sz="quarter" idx="12"/>
           </p:nvPr>
         </p:nvSpPr>
-        <p:spPr/>
+        <p:spPr>
+          <a:xfrm>
+            <a:off x="7099300" y="6356351"/>
+            <a:ext cx="2311400" cy="365125"/>
+          </a:xfrm>
+          <a:prstGeom prst="rect">
+            <a:avLst/>
+          </a:prstGeom>
+        </p:spPr>
         <p:txBody>
           <a:bodyPr/>
           <a:lstStyle/>
           <a:p>
             <a:fld id="{4E0019F3-3029-4221-AB9C-3C43FBFDB166}" type="slidenum">
               <a:rPr lang="de-DE" smtClean="0"/>
+              <a:pPr/>
               <a:t>‹Nr.›</a:t>
             </a:fld>
             <a:endParaRPr lang="de-DE"/>
@@ -4980,214 +5367,365 @@
       </p:grpSpPr>
       <p:sp>
         <p:nvSpPr>
-          <p:cNvPr id="2" name="Titelplatzhalter 1"/>
-          <p:cNvSpPr>
-            <a:spLocks noGrp="1"/>
-          </p:cNvSpPr>
-          <p:nvPr>
-            <p:ph type="title"/>
-          </p:nvPr>
-        </p:nvSpPr>
-        <p:spPr>
-          <a:xfrm>
-            <a:off x="495300" y="274638"/>
-            <a:ext cx="8915400" cy="1143000"/>
+          <p:cNvPr id="7" name="Titel 1"/>
+          <p:cNvSpPr txBox="1">
+            <a:spLocks/>
+          </p:cNvSpPr>
+          <p:nvPr userDrawn="1"/>
+        </p:nvSpPr>
+        <p:spPr>
+          <a:xfrm>
+            <a:off x="2738422" y="785794"/>
+            <a:ext cx="5143536" cy="1470025"/>
           </a:xfrm>
           <a:prstGeom prst="rect">
             <a:avLst/>
           </a:prstGeom>
         </p:spPr>
         <p:txBody>
-          <a:bodyPr vert="horz" lIns="91440" tIns="45720" rIns="91440" bIns="45720" rtlCol="0" anchor="ctr">
-            <a:normAutofit/>
+          <a:bodyPr>
+            <a:normAutofit fontScale="82500" lnSpcReduction="20000"/>
           </a:bodyPr>
           <a:lstStyle/>
           <a:p>
-            <a:r>
-              <a:rPr lang="de-DE" smtClean="0"/>
-              <a:t>Titelmasterformat durch Klicken bearbeiten</a:t>
-            </a:r>
-            <a:endParaRPr lang="de-DE"/>
-          </a:p>
-        </p:txBody>
-      </p:sp>
-      <p:sp>
-        <p:nvSpPr>
-          <p:cNvPr id="3" name="Textplatzhalter 2"/>
-          <p:cNvSpPr>
-            <a:spLocks noGrp="1"/>
-          </p:cNvSpPr>
-          <p:nvPr>
-            <p:ph type="body" idx="1"/>
-          </p:nvPr>
-        </p:nvSpPr>
-        <p:spPr>
-          <a:xfrm>
-            <a:off x="495300" y="1600201"/>
-            <a:ext cx="8915400" cy="4525963"/>
+            <a:pPr marL="0" marR="0" lvl="0" indent="0" algn="ctr" defTabSz="914400" rtl="0" eaLnBrk="1" fontAlgn="auto" latinLnBrk="0" hangingPunct="1">
+              <a:lnSpc>
+                <a:spcPct val="100000"/>
+              </a:lnSpc>
+              <a:spcBef>
+                <a:spcPct val="0"/>
+              </a:spcBef>
+              <a:spcAft>
+                <a:spcPts val="0"/>
+              </a:spcAft>
+              <a:buClrTx/>
+              <a:buSzTx/>
+              <a:buFontTx/>
+              <a:buNone/>
+              <a:tabLst/>
+              <a:defRPr/>
+            </a:pPr>
+            <a:r>
+              <a:rPr kumimoji="0" lang="de-DE" sz="4400" b="0" i="0" u="none" strike="noStrike" kern="1200" cap="none" spc="0" normalizeH="0" baseline="0" noProof="0" smtClean="0">
+                <a:ln>
+                  <a:noFill/>
+                </a:ln>
+                <a:solidFill>
+                  <a:schemeClr val="tx1"/>
+                </a:solidFill>
+                <a:effectLst/>
+                <a:uLnTx/>
+                <a:uFillTx/>
+                <a:latin typeface="+mj-lt"/>
+                <a:ea typeface="+mj-ea"/>
+                <a:cs typeface="+mj-cs"/>
+              </a:rPr>
+              <a:t>Java User Group Mannheim</a:t>
+            </a:r>
+            <a:br>
+              <a:rPr kumimoji="0" lang="de-DE" sz="4400" b="0" i="0" u="none" strike="noStrike" kern="1200" cap="none" spc="0" normalizeH="0" baseline="0" noProof="0" smtClean="0">
+                <a:ln>
+                  <a:noFill/>
+                </a:ln>
+                <a:solidFill>
+                  <a:schemeClr val="tx1"/>
+                </a:solidFill>
+                <a:effectLst/>
+                <a:uLnTx/>
+                <a:uFillTx/>
+                <a:latin typeface="+mj-lt"/>
+                <a:ea typeface="+mj-ea"/>
+                <a:cs typeface="+mj-cs"/>
+              </a:rPr>
+            </a:br>
+            <a:endParaRPr kumimoji="0" lang="de-DE" sz="4400" b="0" i="0" u="none" strike="noStrike" kern="1200" cap="none" spc="0" normalizeH="0" baseline="0" noProof="0" dirty="0">
+              <a:ln>
+                <a:noFill/>
+              </a:ln>
+              <a:solidFill>
+                <a:schemeClr val="tx1"/>
+              </a:solidFill>
+              <a:effectLst/>
+              <a:uLnTx/>
+              <a:uFillTx/>
+              <a:latin typeface="+mj-lt"/>
+              <a:ea typeface="+mj-ea"/>
+              <a:cs typeface="+mj-cs"/>
+            </a:endParaRPr>
+          </a:p>
+        </p:txBody>
+      </p:sp>
+      <p:sp>
+        <p:nvSpPr>
+          <p:cNvPr id="8" name="Untertitel 2"/>
+          <p:cNvSpPr txBox="1">
+            <a:spLocks/>
+          </p:cNvSpPr>
+          <p:nvPr userDrawn="1"/>
+        </p:nvSpPr>
+        <p:spPr>
+          <a:xfrm>
+            <a:off x="738158" y="3643314"/>
+            <a:ext cx="7072362" cy="2643206"/>
           </a:xfrm>
           <a:prstGeom prst="rect">
             <a:avLst/>
           </a:prstGeom>
         </p:spPr>
         <p:txBody>
-          <a:bodyPr vert="horz" lIns="91440" tIns="45720" rIns="91440" bIns="45720" rtlCol="0">
+          <a:bodyPr>
             <a:normAutofit/>
           </a:bodyPr>
-          <a:lstStyle/>
-          <a:p>
-            <a:pPr lvl="0"/>
-            <a:r>
-              <a:rPr lang="de-DE" smtClean="0"/>
-              <a:t>Textmasterformate durch Klicken bearbeiten</a:t>
-            </a:r>
-          </a:p>
-          <a:p>
-            <a:pPr lvl="1"/>
-            <a:r>
-              <a:rPr lang="de-DE" smtClean="0"/>
-              <a:t>Zweite Ebene</a:t>
-            </a:r>
-          </a:p>
-          <a:p>
-            <a:pPr lvl="2"/>
-            <a:r>
-              <a:rPr lang="de-DE" smtClean="0"/>
-              <a:t>Dritte Ebene</a:t>
-            </a:r>
-          </a:p>
-          <a:p>
-            <a:pPr lvl="3"/>
-            <a:r>
-              <a:rPr lang="de-DE" smtClean="0"/>
-              <a:t>Vierte Ebene</a:t>
-            </a:r>
-          </a:p>
-          <a:p>
-            <a:pPr lvl="4"/>
-            <a:r>
-              <a:rPr lang="de-DE" smtClean="0"/>
-              <a:t>Fünfte Ebene</a:t>
-            </a:r>
-            <a:endParaRPr lang="de-DE"/>
-          </a:p>
-        </p:txBody>
-      </p:sp>
-      <p:sp>
-        <p:nvSpPr>
-          <p:cNvPr id="4" name="Datumsplatzhalter 3"/>
-          <p:cNvSpPr>
-            <a:spLocks noGrp="1"/>
-          </p:cNvSpPr>
-          <p:nvPr>
-            <p:ph type="dt" sz="half" idx="2"/>
-          </p:nvPr>
-        </p:nvSpPr>
-        <p:spPr>
-          <a:xfrm>
-            <a:off x="495300" y="6356351"/>
-            <a:ext cx="2311400" cy="365125"/>
+          <a:lstStyle>
+            <a:lvl1pPr>
+              <a:buNone/>
+              <a:defRPr baseline="0"/>
+            </a:lvl1pPr>
+          </a:lstStyle>
+          <a:p>
+            <a:pPr marL="342900" marR="0" lvl="0" indent="-342900" algn="l" defTabSz="914400" rtl="0" eaLnBrk="1" fontAlgn="auto" latinLnBrk="0" hangingPunct="1">
+              <a:lnSpc>
+                <a:spcPct val="100000"/>
+              </a:lnSpc>
+              <a:spcBef>
+                <a:spcPct val="20000"/>
+              </a:spcBef>
+              <a:spcAft>
+                <a:spcPts val="0"/>
+              </a:spcAft>
+              <a:buClrTx/>
+              <a:buSzTx/>
+              <a:buFont typeface="Arial" pitchFamily="34" charset="0"/>
+              <a:buNone/>
+              <a:tabLst/>
+              <a:defRPr/>
+            </a:pPr>
+            <a:r>
+              <a:rPr kumimoji="0" lang="de-DE" sz="3200" b="0" i="0" u="none" strike="noStrike" kern="1200" cap="none" spc="0" normalizeH="0" baseline="0" noProof="0" dirty="0" smtClean="0">
+                <a:ln>
+                  <a:noFill/>
+                </a:ln>
+                <a:solidFill>
+                  <a:schemeClr val="tx1"/>
+                </a:solidFill>
+                <a:effectLst/>
+                <a:uLnTx/>
+                <a:uFillTx/>
+                <a:latin typeface="+mn-lt"/>
+                <a:ea typeface="+mn-ea"/>
+                <a:cs typeface="+mn-cs"/>
+              </a:rPr>
+              <a:t>Vortrag: </a:t>
+            </a:r>
+          </a:p>
+          <a:p>
+            <a:pPr marL="342900" marR="0" lvl="0" indent="-342900" algn="l" defTabSz="914400" rtl="0" eaLnBrk="1" fontAlgn="auto" latinLnBrk="0" hangingPunct="1">
+              <a:lnSpc>
+                <a:spcPct val="100000"/>
+              </a:lnSpc>
+              <a:spcBef>
+                <a:spcPct val="20000"/>
+              </a:spcBef>
+              <a:spcAft>
+                <a:spcPts val="0"/>
+              </a:spcAft>
+              <a:buClrTx/>
+              <a:buSzTx/>
+              <a:buFont typeface="Arial" pitchFamily="34" charset="0"/>
+              <a:buNone/>
+              <a:tabLst/>
+              <a:defRPr/>
+            </a:pPr>
+            <a:r>
+              <a:rPr kumimoji="0" lang="de-DE" sz="3200" b="0" i="0" u="none" strike="noStrike" kern="1200" cap="none" spc="0" normalizeH="0" baseline="0" noProof="0" dirty="0" smtClean="0">
+                <a:ln>
+                  <a:noFill/>
+                </a:ln>
+                <a:solidFill>
+                  <a:schemeClr val="tx1"/>
+                </a:solidFill>
+                <a:effectLst/>
+                <a:uLnTx/>
+                <a:uFillTx/>
+                <a:latin typeface="+mn-lt"/>
+                <a:ea typeface="+mn-ea"/>
+                <a:cs typeface="+mn-cs"/>
+              </a:rPr>
+              <a:t>„</a:t>
+            </a:r>
+            <a:r>
+              <a:rPr lang="nl-NL" sz="3200" b="0" i="0" baseline="0" dirty="0" smtClean="0"/>
+              <a:t>Cloud Computing mit Google App Engine</a:t>
+            </a:r>
+            <a:r>
+              <a:rPr kumimoji="0" lang="de-DE" sz="3200" b="0" i="0" u="none" strike="noStrike" kern="1200" cap="none" spc="0" normalizeH="0" baseline="0" noProof="0" dirty="0" smtClean="0">
+                <a:ln>
+                  <a:noFill/>
+                </a:ln>
+                <a:solidFill>
+                  <a:schemeClr val="tx1"/>
+                </a:solidFill>
+                <a:effectLst/>
+                <a:uLnTx/>
+                <a:uFillTx/>
+                <a:latin typeface="+mn-lt"/>
+                <a:ea typeface="+mn-ea"/>
+                <a:cs typeface="+mn-cs"/>
+              </a:rPr>
+              <a:t>"</a:t>
+            </a:r>
+          </a:p>
+          <a:p>
+            <a:pPr marL="342900" marR="0" lvl="0" indent="-342900" algn="r" defTabSz="914400" rtl="0" eaLnBrk="1" fontAlgn="auto" latinLnBrk="0" hangingPunct="1">
+              <a:lnSpc>
+                <a:spcPct val="100000"/>
+              </a:lnSpc>
+              <a:spcBef>
+                <a:spcPct val="20000"/>
+              </a:spcBef>
+              <a:spcAft>
+                <a:spcPts val="0"/>
+              </a:spcAft>
+              <a:buClrTx/>
+              <a:buSzTx/>
+              <a:buFont typeface="Arial" pitchFamily="34" charset="0"/>
+              <a:buNone/>
+              <a:tabLst/>
+              <a:defRPr/>
+            </a:pPr>
+            <a:r>
+              <a:rPr kumimoji="0" lang="de-DE" sz="3200" b="1" i="0" u="none" strike="noStrike" kern="1200" cap="none" spc="0" normalizeH="0" baseline="0" noProof="0" dirty="0" smtClean="0">
+                <a:ln>
+                  <a:noFill/>
+                </a:ln>
+                <a:solidFill>
+                  <a:schemeClr val="tx1"/>
+                </a:solidFill>
+                <a:effectLst/>
+                <a:uLnTx/>
+                <a:uFillTx/>
+                <a:latin typeface="+mn-lt"/>
+                <a:ea typeface="+mn-ea"/>
+                <a:cs typeface="+mn-cs"/>
+              </a:rPr>
+              <a:t>A5, Raum C012</a:t>
+            </a:r>
+            <a:endParaRPr kumimoji="0" lang="de-DE" sz="3200" b="0" i="0" u="none" strike="noStrike" kern="1200" cap="none" spc="0" normalizeH="0" baseline="0" noProof="0" dirty="0" smtClean="0">
+              <a:ln>
+                <a:noFill/>
+              </a:ln>
+              <a:solidFill>
+                <a:schemeClr val="tx1"/>
+              </a:solidFill>
+              <a:effectLst/>
+              <a:uLnTx/>
+              <a:uFillTx/>
+              <a:latin typeface="+mn-lt"/>
+              <a:ea typeface="+mn-ea"/>
+              <a:cs typeface="+mn-cs"/>
+            </a:endParaRPr>
+          </a:p>
+          <a:p>
+            <a:pPr marL="342900" marR="0" lvl="0" indent="-342900" algn="l" defTabSz="914400" rtl="0" eaLnBrk="1" fontAlgn="auto" latinLnBrk="0" hangingPunct="1">
+              <a:lnSpc>
+                <a:spcPct val="100000"/>
+              </a:lnSpc>
+              <a:spcBef>
+                <a:spcPct val="20000"/>
+              </a:spcBef>
+              <a:spcAft>
+                <a:spcPts val="0"/>
+              </a:spcAft>
+              <a:buClrTx/>
+              <a:buSzTx/>
+              <a:buFont typeface="Arial" pitchFamily="34" charset="0"/>
+              <a:buNone/>
+              <a:tabLst/>
+              <a:defRPr/>
+            </a:pPr>
+            <a:endParaRPr kumimoji="0" lang="de-DE" sz="3200" b="0" i="0" u="none" strike="noStrike" kern="1200" cap="none" spc="0" normalizeH="0" baseline="0" noProof="0" dirty="0">
+              <a:ln>
+                <a:noFill/>
+              </a:ln>
+              <a:solidFill>
+                <a:schemeClr val="tx1"/>
+              </a:solidFill>
+              <a:effectLst/>
+              <a:uLnTx/>
+              <a:uFillTx/>
+              <a:latin typeface="+mn-lt"/>
+              <a:ea typeface="+mn-ea"/>
+              <a:cs typeface="+mn-cs"/>
+            </a:endParaRPr>
+          </a:p>
+        </p:txBody>
+      </p:sp>
+      <p:pic>
+        <p:nvPicPr>
+          <p:cNvPr id="9" name="Bild 4"/>
+          <p:cNvPicPr>
+            <a:picLocks noChangeAspect="1" noChangeArrowheads="1"/>
+          </p:cNvPicPr>
+          <p:nvPr userDrawn="1"/>
+        </p:nvPicPr>
+        <p:blipFill>
+          <a:blip r:embed="rId13" cstate="print"/>
+          <a:srcRect/>
+          <a:stretch>
+            <a:fillRect/>
+          </a:stretch>
+        </p:blipFill>
+        <p:spPr bwMode="auto">
+          <a:xfrm>
+            <a:off x="238092" y="214290"/>
+            <a:ext cx="3168650" cy="2593975"/>
           </a:xfrm>
           <a:prstGeom prst="rect">
             <a:avLst/>
           </a:prstGeom>
-        </p:spPr>
-        <p:txBody>
-          <a:bodyPr vert="horz" lIns="91440" tIns="45720" rIns="91440" bIns="45720" rtlCol="0" anchor="ctr"/>
-          <a:lstStyle>
-            <a:lvl1pPr algn="l">
-              <a:defRPr sz="1200">
-                <a:solidFill>
-                  <a:schemeClr val="tx1">
-                    <a:tint val="75000"/>
-                  </a:schemeClr>
-                </a:solidFill>
-              </a:defRPr>
-            </a:lvl1pPr>
-          </a:lstStyle>
-          <a:p>
-            <a:fld id="{835DC513-C344-49AA-8AE7-00A196E93F3C}" type="datetimeFigureOut">
-              <a:rPr lang="de-DE" smtClean="0"/>
-              <a:t>03.03.2011</a:t>
-            </a:fld>
-            <a:endParaRPr lang="de-DE"/>
-          </a:p>
-        </p:txBody>
-      </p:sp>
-      <p:sp>
-        <p:nvSpPr>
-          <p:cNvPr id="5" name="Fußzeilenplatzhalter 4"/>
-          <p:cNvSpPr>
-            <a:spLocks noGrp="1"/>
-          </p:cNvSpPr>
-          <p:nvPr>
-            <p:ph type="ftr" sz="quarter" idx="3"/>
-          </p:nvPr>
-        </p:nvSpPr>
-        <p:spPr>
-          <a:xfrm>
-            <a:off x="3384550" y="6356351"/>
-            <a:ext cx="3136900" cy="365125"/>
+          <a:noFill/>
+          <a:ln w="9525">
+            <a:noFill/>
+            <a:miter lim="800000"/>
+            <a:headEnd/>
+            <a:tailEnd/>
+          </a:ln>
+        </p:spPr>
+      </p:pic>
+      <p:sp>
+        <p:nvSpPr>
+          <p:cNvPr id="10" name="Rectangle 4"/>
+          <p:cNvSpPr>
+            <a:spLocks noChangeArrowheads="1"/>
+          </p:cNvSpPr>
+          <p:nvPr userDrawn="1"/>
+        </p:nvSpPr>
+        <p:spPr bwMode="auto">
+          <a:xfrm>
+            <a:off x="0" y="0"/>
+            <a:ext cx="9906000" cy="457200"/>
           </a:xfrm>
           <a:prstGeom prst="rect">
             <a:avLst/>
           </a:prstGeom>
-        </p:spPr>
-        <p:txBody>
-          <a:bodyPr vert="horz" lIns="91440" tIns="45720" rIns="91440" bIns="45720" rtlCol="0" anchor="ctr"/>
-          <a:lstStyle>
-            <a:lvl1pPr algn="ctr">
-              <a:defRPr sz="1200">
-                <a:solidFill>
-                  <a:schemeClr val="tx1">
-                    <a:tint val="75000"/>
-                  </a:schemeClr>
-                </a:solidFill>
-              </a:defRPr>
-            </a:lvl1pPr>
-          </a:lstStyle>
-          <a:p>
-            <a:endParaRPr lang="de-DE"/>
-          </a:p>
-        </p:txBody>
-      </p:sp>
-      <p:sp>
-        <p:nvSpPr>
-          <p:cNvPr id="6" name="Foliennummernplatzhalter 5"/>
-          <p:cNvSpPr>
-            <a:spLocks noGrp="1"/>
-          </p:cNvSpPr>
-          <p:nvPr>
-            <p:ph type="sldNum" sz="quarter" idx="4"/>
-          </p:nvPr>
-        </p:nvSpPr>
-        <p:spPr>
-          <a:xfrm>
-            <a:off x="7099300" y="6356351"/>
-            <a:ext cx="2311400" cy="365125"/>
-          </a:xfrm>
-          <a:prstGeom prst="rect">
-            <a:avLst/>
-          </a:prstGeom>
-        </p:spPr>
-        <p:txBody>
-          <a:bodyPr vert="horz" lIns="91440" tIns="45720" rIns="91440" bIns="45720" rtlCol="0" anchor="ctr"/>
-          <a:lstStyle>
-            <a:lvl1pPr algn="r">
-              <a:defRPr sz="1200">
-                <a:solidFill>
-                  <a:schemeClr val="tx1">
-                    <a:tint val="75000"/>
-                  </a:schemeClr>
-                </a:solidFill>
-              </a:defRPr>
-            </a:lvl1pPr>
-          </a:lstStyle>
-          <a:p>
-            <a:fld id="{4E0019F3-3029-4221-AB9C-3C43FBFDB166}" type="slidenum">
-              <a:rPr lang="de-DE" smtClean="0"/>
-              <a:t>‹Nr.›</a:t>
-            </a:fld>
+          <a:noFill/>
+          <a:ln w="9525">
+            <a:noFill/>
+            <a:miter lim="800000"/>
+            <a:headEnd/>
+            <a:tailEnd/>
+          </a:ln>
+          <a:effectLst/>
+        </p:spPr>
+        <p:txBody>
+          <a:bodyPr vert="horz" wrap="none" lIns="91440" tIns="45720" rIns="91440" bIns="45720" numCol="1" anchor="ctr" anchorCtr="0" compatLnSpc="1">
+            <a:prstTxWarp prst="textNoShape">
+              <a:avLst/>
+            </a:prstTxWarp>
+            <a:spAutoFit/>
+          </a:bodyPr>
+          <a:lstStyle/>
+          <a:p>
             <a:endParaRPr lang="de-DE"/>
           </a:p>
         </p:txBody>
@@ -5613,7 +6151,8 @@
           <a:p>
             <a:fld id="{0E4C24D9-47E7-4B51-AC88-546B4AA38802}" type="datetimeFigureOut">
               <a:rPr lang="de-DE" smtClean="0"/>
-              <a:t>03.03.2011</a:t>
+              <a:pPr/>
+              <a:t>21.04.2011</a:t>
             </a:fld>
             <a:endParaRPr lang="de-DE"/>
           </a:p>
@@ -5691,6 +6230,7 @@
           <a:p>
             <a:fld id="{BB3CE0FA-406E-42B9-A445-953C2CC35DD4}" type="slidenum">
               <a:rPr lang="de-DE" smtClean="0"/>
+              <a:pPr/>
               <a:t>‹Nr.›</a:t>
             </a:fld>
             <a:endParaRPr lang="de-DE"/>
@@ -5983,249 +6523,6 @@
           <a:chExt cx="0" cy="0"/>
         </a:xfrm>
       </p:grpSpPr>
-      <p:sp>
-        <p:nvSpPr>
-          <p:cNvPr id="2" name="Titel 1"/>
-          <p:cNvSpPr>
-            <a:spLocks noGrp="1"/>
-          </p:cNvSpPr>
-          <p:nvPr>
-            <p:ph type="ctrTitle"/>
-          </p:nvPr>
-        </p:nvSpPr>
-        <p:spPr>
-          <a:xfrm>
-            <a:off x="2738422" y="785794"/>
-            <a:ext cx="5143536" cy="1470025"/>
-          </a:xfrm>
-        </p:spPr>
-        <p:txBody>
-          <a:bodyPr>
-            <a:normAutofit fontScale="90000"/>
-          </a:bodyPr>
-          <a:lstStyle/>
-          <a:p>
-            <a:r>
-              <a:rPr lang="de-DE" dirty="0"/>
-              <a:t>Java User Group Mannheim</a:t>
-            </a:r>
-            <a:br>
-              <a:rPr lang="de-DE" dirty="0"/>
-            </a:br>
-            <a:endParaRPr lang="de-DE" dirty="0"/>
-          </a:p>
-        </p:txBody>
-      </p:sp>
-      <p:sp>
-        <p:nvSpPr>
-          <p:cNvPr id="3" name="Untertitel 2"/>
-          <p:cNvSpPr>
-            <a:spLocks noGrp="1"/>
-          </p:cNvSpPr>
-          <p:nvPr>
-            <p:ph type="subTitle" idx="4294967295"/>
-          </p:nvPr>
-        </p:nvSpPr>
-        <p:spPr>
-          <a:xfrm>
-            <a:off x="738158" y="3643314"/>
-            <a:ext cx="7072362" cy="2643206"/>
-          </a:xfrm>
-        </p:spPr>
-        <p:txBody>
-          <a:bodyPr>
-            <a:normAutofit/>
-          </a:bodyPr>
-          <a:lstStyle/>
-          <a:p>
-            <a:pPr algn="l">
-              <a:buNone/>
-            </a:pPr>
-            <a:r>
-              <a:rPr lang="de-DE" dirty="0">
-                <a:solidFill>
-                  <a:schemeClr val="tx1"/>
-                </a:solidFill>
-              </a:rPr>
-              <a:t>Vortrag: </a:t>
-            </a:r>
-            <a:br>
-              <a:rPr lang="de-DE" dirty="0">
-                <a:solidFill>
-                  <a:schemeClr val="tx1"/>
-                </a:solidFill>
-              </a:rPr>
-            </a:br>
-            <a:r>
-              <a:rPr lang="de-DE" dirty="0">
-                <a:solidFill>
-                  <a:schemeClr val="tx1"/>
-                </a:solidFill>
-              </a:rPr>
-              <a:t>"Verteiltes Rechnen mit Apache </a:t>
-            </a:r>
-            <a:r>
-              <a:rPr lang="de-DE" dirty="0" err="1">
-                <a:solidFill>
-                  <a:schemeClr val="tx1"/>
-                </a:solidFill>
-              </a:rPr>
-              <a:t>Hadoop</a:t>
-            </a:r>
-            <a:r>
-              <a:rPr lang="de-DE" dirty="0">
-                <a:solidFill>
-                  <a:schemeClr val="tx1"/>
-                </a:solidFill>
-              </a:rPr>
-              <a:t> und </a:t>
-            </a:r>
-            <a:r>
-              <a:rPr lang="de-DE" dirty="0" err="1">
-                <a:solidFill>
-                  <a:schemeClr val="tx1"/>
-                </a:solidFill>
-              </a:rPr>
-              <a:t>Map</a:t>
-            </a:r>
-            <a:r>
-              <a:rPr lang="de-DE" dirty="0">
-                <a:solidFill>
-                  <a:schemeClr val="tx1"/>
-                </a:solidFill>
-              </a:rPr>
-              <a:t>/</a:t>
-            </a:r>
-            <a:r>
-              <a:rPr lang="de-DE" dirty="0" err="1">
-                <a:solidFill>
-                  <a:schemeClr val="tx1"/>
-                </a:solidFill>
-              </a:rPr>
-              <a:t>Reduce</a:t>
-            </a:r>
-            <a:r>
-              <a:rPr lang="de-DE" dirty="0">
-                <a:solidFill>
-                  <a:schemeClr val="tx1"/>
-                </a:solidFill>
-              </a:rPr>
-              <a:t>"</a:t>
-            </a:r>
-          </a:p>
-          <a:p>
-            <a:pPr algn="r">
-              <a:buNone/>
-            </a:pPr>
-            <a:r>
-              <a:rPr lang="de-DE" b="1" dirty="0">
-                <a:solidFill>
-                  <a:schemeClr val="tx1"/>
-                </a:solidFill>
-              </a:rPr>
-              <a:t>A5, Raum </a:t>
-            </a:r>
-            <a:r>
-              <a:rPr lang="de-DE" b="1" dirty="0" smtClean="0">
-                <a:solidFill>
-                  <a:schemeClr val="tx1"/>
-                </a:solidFill>
-              </a:rPr>
-              <a:t>C013</a:t>
-            </a:r>
-            <a:r>
-              <a:rPr lang="de-DE" b="1" dirty="0" smtClean="0">
-                <a:solidFill>
-                  <a:schemeClr val="tx1"/>
-                </a:solidFill>
-              </a:rPr>
-              <a:t>, 19 Uhr</a:t>
-            </a:r>
-            <a:endParaRPr lang="de-DE" dirty="0">
-              <a:solidFill>
-                <a:schemeClr val="tx1"/>
-              </a:solidFill>
-            </a:endParaRPr>
-          </a:p>
-          <a:p>
-            <a:endParaRPr lang="de-DE" dirty="0">
-              <a:solidFill>
-                <a:schemeClr val="tx1"/>
-              </a:solidFill>
-            </a:endParaRPr>
-          </a:p>
-        </p:txBody>
-      </p:sp>
-      <p:pic>
-        <p:nvPicPr>
-          <p:cNvPr id="1026" name="Bild 4"/>
-          <p:cNvPicPr>
-            <a:picLocks noChangeAspect="1" noChangeArrowheads="1"/>
-          </p:cNvPicPr>
-          <p:nvPr/>
-        </p:nvPicPr>
-        <p:blipFill>
-          <a:blip r:embed="rId2" cstate="print"/>
-          <a:srcRect/>
-          <a:stretch>
-            <a:fillRect/>
-          </a:stretch>
-        </p:blipFill>
-        <p:spPr bwMode="auto">
-          <a:xfrm>
-            <a:off x="238092" y="214290"/>
-            <a:ext cx="3168650" cy="2593975"/>
-          </a:xfrm>
-          <a:prstGeom prst="rect">
-            <a:avLst/>
-          </a:prstGeom>
-          <a:noFill/>
-          <a:ln w="9525">
-            <a:noFill/>
-            <a:miter lim="800000"/>
-            <a:headEnd/>
-            <a:tailEnd/>
-          </a:ln>
-        </p:spPr>
-      </p:pic>
-      <p:sp>
-        <p:nvSpPr>
-          <p:cNvPr id="1028" name="Rectangle 4"/>
-          <p:cNvSpPr>
-            <a:spLocks noChangeArrowheads="1"/>
-          </p:cNvSpPr>
-          <p:nvPr/>
-        </p:nvSpPr>
-        <p:spPr bwMode="auto">
-          <a:xfrm>
-            <a:off x="0" y="0"/>
-            <a:ext cx="9906000" cy="457200"/>
-          </a:xfrm>
-          <a:prstGeom prst="rect">
-            <a:avLst/>
-          </a:prstGeom>
-          <a:noFill/>
-          <a:ln w="9525">
-            <a:noFill/>
-            <a:miter lim="800000"/>
-            <a:headEnd/>
-            <a:tailEnd/>
-          </a:ln>
-          <a:effectLst/>
-        </p:spPr>
-        <p:txBody>
-          <a:bodyPr vert="horz" wrap="none" lIns="91440" tIns="45720" rIns="91440" bIns="45720" numCol="1" anchor="ctr" anchorCtr="0" compatLnSpc="1">
-            <a:prstTxWarp prst="textNoShape">
-              <a:avLst/>
-            </a:prstTxWarp>
-            <a:spAutoFit/>
-          </a:bodyPr>
-          <a:lstStyle/>
-          <a:p>
-            <a:endParaRPr lang="de-DE"/>
-          </a:p>
-        </p:txBody>
-      </p:sp>
     </p:spTree>
   </p:cSld>
   <p:clrMapOvr>
@@ -6253,249 +6550,6 @@
       </p:grpSpPr>
       <p:sp>
         <p:nvSpPr>
-          <p:cNvPr id="2" name="Titel 1"/>
-          <p:cNvSpPr>
-            <a:spLocks noGrp="1"/>
-          </p:cNvSpPr>
-          <p:nvPr>
-            <p:ph type="ctrTitle"/>
-          </p:nvPr>
-        </p:nvSpPr>
-        <p:spPr>
-          <a:xfrm>
-            <a:off x="2738422" y="785794"/>
-            <a:ext cx="5143536" cy="1470025"/>
-          </a:xfrm>
-        </p:spPr>
-        <p:txBody>
-          <a:bodyPr>
-            <a:normAutofit fontScale="90000"/>
-          </a:bodyPr>
-          <a:lstStyle/>
-          <a:p>
-            <a:r>
-              <a:rPr lang="de-DE" dirty="0"/>
-              <a:t>Java User Group Mannheim</a:t>
-            </a:r>
-            <a:br>
-              <a:rPr lang="de-DE" dirty="0"/>
-            </a:br>
-            <a:endParaRPr lang="de-DE" dirty="0"/>
-          </a:p>
-        </p:txBody>
-      </p:sp>
-      <p:sp>
-        <p:nvSpPr>
-          <p:cNvPr id="3" name="Untertitel 2"/>
-          <p:cNvSpPr>
-            <a:spLocks noGrp="1"/>
-          </p:cNvSpPr>
-          <p:nvPr>
-            <p:ph type="subTitle" idx="4294967295"/>
-          </p:nvPr>
-        </p:nvSpPr>
-        <p:spPr>
-          <a:xfrm>
-            <a:off x="738158" y="3643314"/>
-            <a:ext cx="7072362" cy="2643206"/>
-          </a:xfrm>
-        </p:spPr>
-        <p:txBody>
-          <a:bodyPr>
-            <a:normAutofit/>
-          </a:bodyPr>
-          <a:lstStyle/>
-          <a:p>
-            <a:pPr algn="l">
-              <a:buNone/>
-            </a:pPr>
-            <a:r>
-              <a:rPr lang="de-DE" dirty="0">
-                <a:solidFill>
-                  <a:schemeClr val="tx1"/>
-                </a:solidFill>
-              </a:rPr>
-              <a:t>Vortrag: </a:t>
-            </a:r>
-            <a:br>
-              <a:rPr lang="de-DE" dirty="0">
-                <a:solidFill>
-                  <a:schemeClr val="tx1"/>
-                </a:solidFill>
-              </a:rPr>
-            </a:br>
-            <a:r>
-              <a:rPr lang="de-DE" dirty="0">
-                <a:solidFill>
-                  <a:schemeClr val="tx1"/>
-                </a:solidFill>
-              </a:rPr>
-              <a:t>"Verteiltes Rechnen mit Apache </a:t>
-            </a:r>
-            <a:r>
-              <a:rPr lang="de-DE" dirty="0" err="1">
-                <a:solidFill>
-                  <a:schemeClr val="tx1"/>
-                </a:solidFill>
-              </a:rPr>
-              <a:t>Hadoop</a:t>
-            </a:r>
-            <a:r>
-              <a:rPr lang="de-DE" dirty="0">
-                <a:solidFill>
-                  <a:schemeClr val="tx1"/>
-                </a:solidFill>
-              </a:rPr>
-              <a:t> und </a:t>
-            </a:r>
-            <a:r>
-              <a:rPr lang="de-DE" dirty="0" err="1">
-                <a:solidFill>
-                  <a:schemeClr val="tx1"/>
-                </a:solidFill>
-              </a:rPr>
-              <a:t>Map</a:t>
-            </a:r>
-            <a:r>
-              <a:rPr lang="de-DE" dirty="0">
-                <a:solidFill>
-                  <a:schemeClr val="tx1"/>
-                </a:solidFill>
-              </a:rPr>
-              <a:t>/</a:t>
-            </a:r>
-            <a:r>
-              <a:rPr lang="de-DE" dirty="0" err="1">
-                <a:solidFill>
-                  <a:schemeClr val="tx1"/>
-                </a:solidFill>
-              </a:rPr>
-              <a:t>Reduce</a:t>
-            </a:r>
-            <a:r>
-              <a:rPr lang="de-DE" dirty="0">
-                <a:solidFill>
-                  <a:schemeClr val="tx1"/>
-                </a:solidFill>
-              </a:rPr>
-              <a:t>"</a:t>
-            </a:r>
-          </a:p>
-          <a:p>
-            <a:pPr algn="r">
-              <a:buNone/>
-            </a:pPr>
-            <a:r>
-              <a:rPr lang="de-DE" b="1" dirty="0">
-                <a:solidFill>
-                  <a:schemeClr val="tx1"/>
-                </a:solidFill>
-              </a:rPr>
-              <a:t>A5, Raum </a:t>
-            </a:r>
-            <a:r>
-              <a:rPr lang="de-DE" b="1" dirty="0" smtClean="0">
-                <a:solidFill>
-                  <a:schemeClr val="tx1"/>
-                </a:solidFill>
-              </a:rPr>
-              <a:t>C013</a:t>
-            </a:r>
-            <a:r>
-              <a:rPr lang="de-DE" b="1" dirty="0" smtClean="0">
-                <a:solidFill>
-                  <a:schemeClr val="tx1"/>
-                </a:solidFill>
-              </a:rPr>
-              <a:t>, 19 Uhr</a:t>
-            </a:r>
-            <a:endParaRPr lang="de-DE" dirty="0">
-              <a:solidFill>
-                <a:schemeClr val="tx1"/>
-              </a:solidFill>
-            </a:endParaRPr>
-          </a:p>
-          <a:p>
-            <a:endParaRPr lang="de-DE" dirty="0">
-              <a:solidFill>
-                <a:schemeClr val="tx1"/>
-              </a:solidFill>
-            </a:endParaRPr>
-          </a:p>
-        </p:txBody>
-      </p:sp>
-      <p:pic>
-        <p:nvPicPr>
-          <p:cNvPr id="1026" name="Bild 4"/>
-          <p:cNvPicPr>
-            <a:picLocks noChangeAspect="1" noChangeArrowheads="1"/>
-          </p:cNvPicPr>
-          <p:nvPr/>
-        </p:nvPicPr>
-        <p:blipFill>
-          <a:blip r:embed="rId2" cstate="print"/>
-          <a:srcRect/>
-          <a:stretch>
-            <a:fillRect/>
-          </a:stretch>
-        </p:blipFill>
-        <p:spPr bwMode="auto">
-          <a:xfrm>
-            <a:off x="238092" y="214290"/>
-            <a:ext cx="3168650" cy="2593975"/>
-          </a:xfrm>
-          <a:prstGeom prst="rect">
-            <a:avLst/>
-          </a:prstGeom>
-          <a:noFill/>
-          <a:ln w="9525">
-            <a:noFill/>
-            <a:miter lim="800000"/>
-            <a:headEnd/>
-            <a:tailEnd/>
-          </a:ln>
-        </p:spPr>
-      </p:pic>
-      <p:sp>
-        <p:nvSpPr>
-          <p:cNvPr id="1028" name="Rectangle 4"/>
-          <p:cNvSpPr>
-            <a:spLocks noChangeArrowheads="1"/>
-          </p:cNvSpPr>
-          <p:nvPr/>
-        </p:nvSpPr>
-        <p:spPr bwMode="auto">
-          <a:xfrm>
-            <a:off x="0" y="0"/>
-            <a:ext cx="9906000" cy="457200"/>
-          </a:xfrm>
-          <a:prstGeom prst="rect">
-            <a:avLst/>
-          </a:prstGeom>
-          <a:noFill/>
-          <a:ln w="9525">
-            <a:noFill/>
-            <a:miter lim="800000"/>
-            <a:headEnd/>
-            <a:tailEnd/>
-          </a:ln>
-          <a:effectLst/>
-        </p:spPr>
-        <p:txBody>
-          <a:bodyPr vert="horz" wrap="none" lIns="91440" tIns="45720" rIns="91440" bIns="45720" numCol="1" anchor="ctr" anchorCtr="0" compatLnSpc="1">
-            <a:prstTxWarp prst="textNoShape">
-              <a:avLst/>
-            </a:prstTxWarp>
-            <a:spAutoFit/>
-          </a:bodyPr>
-          <a:lstStyle/>
-          <a:p>
-            <a:endParaRPr lang="de-DE"/>
-          </a:p>
-        </p:txBody>
-      </p:sp>
-      <p:sp>
-        <p:nvSpPr>
           <p:cNvPr id="1030" name="AutoShape 6"/>
           <p:cNvSpPr>
             <a:spLocks noChangeArrowheads="1"/>
@@ -6564,249 +6618,6 @@
       </p:grpSpPr>
       <p:sp>
         <p:nvSpPr>
-          <p:cNvPr id="2" name="Titel 1"/>
-          <p:cNvSpPr>
-            <a:spLocks noGrp="1"/>
-          </p:cNvSpPr>
-          <p:nvPr>
-            <p:ph type="ctrTitle"/>
-          </p:nvPr>
-        </p:nvSpPr>
-        <p:spPr>
-          <a:xfrm>
-            <a:off x="2738422" y="785794"/>
-            <a:ext cx="5143536" cy="1470025"/>
-          </a:xfrm>
-        </p:spPr>
-        <p:txBody>
-          <a:bodyPr>
-            <a:normAutofit fontScale="90000"/>
-          </a:bodyPr>
-          <a:lstStyle/>
-          <a:p>
-            <a:r>
-              <a:rPr lang="de-DE" dirty="0"/>
-              <a:t>Java User Group Mannheim</a:t>
-            </a:r>
-            <a:br>
-              <a:rPr lang="de-DE" dirty="0"/>
-            </a:br>
-            <a:endParaRPr lang="de-DE" dirty="0"/>
-          </a:p>
-        </p:txBody>
-      </p:sp>
-      <p:sp>
-        <p:nvSpPr>
-          <p:cNvPr id="3" name="Untertitel 2"/>
-          <p:cNvSpPr>
-            <a:spLocks noGrp="1"/>
-          </p:cNvSpPr>
-          <p:nvPr>
-            <p:ph type="subTitle" idx="4294967295"/>
-          </p:nvPr>
-        </p:nvSpPr>
-        <p:spPr>
-          <a:xfrm>
-            <a:off x="738158" y="3643314"/>
-            <a:ext cx="7072362" cy="2643206"/>
-          </a:xfrm>
-        </p:spPr>
-        <p:txBody>
-          <a:bodyPr>
-            <a:normAutofit/>
-          </a:bodyPr>
-          <a:lstStyle/>
-          <a:p>
-            <a:pPr algn="l">
-              <a:buNone/>
-            </a:pPr>
-            <a:r>
-              <a:rPr lang="de-DE" dirty="0">
-                <a:solidFill>
-                  <a:schemeClr val="tx1"/>
-                </a:solidFill>
-              </a:rPr>
-              <a:t>Vortrag: </a:t>
-            </a:r>
-            <a:br>
-              <a:rPr lang="de-DE" dirty="0">
-                <a:solidFill>
-                  <a:schemeClr val="tx1"/>
-                </a:solidFill>
-              </a:rPr>
-            </a:br>
-            <a:r>
-              <a:rPr lang="de-DE" dirty="0">
-                <a:solidFill>
-                  <a:schemeClr val="tx1"/>
-                </a:solidFill>
-              </a:rPr>
-              <a:t>"Verteiltes Rechnen mit Apache </a:t>
-            </a:r>
-            <a:r>
-              <a:rPr lang="de-DE" dirty="0" err="1">
-                <a:solidFill>
-                  <a:schemeClr val="tx1"/>
-                </a:solidFill>
-              </a:rPr>
-              <a:t>Hadoop</a:t>
-            </a:r>
-            <a:r>
-              <a:rPr lang="de-DE" dirty="0">
-                <a:solidFill>
-                  <a:schemeClr val="tx1"/>
-                </a:solidFill>
-              </a:rPr>
-              <a:t> und </a:t>
-            </a:r>
-            <a:r>
-              <a:rPr lang="de-DE" dirty="0" err="1">
-                <a:solidFill>
-                  <a:schemeClr val="tx1"/>
-                </a:solidFill>
-              </a:rPr>
-              <a:t>Map</a:t>
-            </a:r>
-            <a:r>
-              <a:rPr lang="de-DE" dirty="0">
-                <a:solidFill>
-                  <a:schemeClr val="tx1"/>
-                </a:solidFill>
-              </a:rPr>
-              <a:t>/</a:t>
-            </a:r>
-            <a:r>
-              <a:rPr lang="de-DE" dirty="0" err="1">
-                <a:solidFill>
-                  <a:schemeClr val="tx1"/>
-                </a:solidFill>
-              </a:rPr>
-              <a:t>Reduce</a:t>
-            </a:r>
-            <a:r>
-              <a:rPr lang="de-DE" dirty="0">
-                <a:solidFill>
-                  <a:schemeClr val="tx1"/>
-                </a:solidFill>
-              </a:rPr>
-              <a:t>"</a:t>
-            </a:r>
-          </a:p>
-          <a:p>
-            <a:pPr algn="r">
-              <a:buNone/>
-            </a:pPr>
-            <a:r>
-              <a:rPr lang="de-DE" b="1" dirty="0">
-                <a:solidFill>
-                  <a:schemeClr val="tx1"/>
-                </a:solidFill>
-              </a:rPr>
-              <a:t>A5, Raum </a:t>
-            </a:r>
-            <a:r>
-              <a:rPr lang="de-DE" b="1" dirty="0" smtClean="0">
-                <a:solidFill>
-                  <a:schemeClr val="tx1"/>
-                </a:solidFill>
-              </a:rPr>
-              <a:t>C013</a:t>
-            </a:r>
-            <a:r>
-              <a:rPr lang="de-DE" b="1" dirty="0" smtClean="0">
-                <a:solidFill>
-                  <a:schemeClr val="tx1"/>
-                </a:solidFill>
-              </a:rPr>
-              <a:t>, 19 Uhr</a:t>
-            </a:r>
-            <a:endParaRPr lang="de-DE" dirty="0">
-              <a:solidFill>
-                <a:schemeClr val="tx1"/>
-              </a:solidFill>
-            </a:endParaRPr>
-          </a:p>
-          <a:p>
-            <a:endParaRPr lang="de-DE" dirty="0">
-              <a:solidFill>
-                <a:schemeClr val="tx1"/>
-              </a:solidFill>
-            </a:endParaRPr>
-          </a:p>
-        </p:txBody>
-      </p:sp>
-      <p:pic>
-        <p:nvPicPr>
-          <p:cNvPr id="1026" name="Bild 4"/>
-          <p:cNvPicPr>
-            <a:picLocks noChangeAspect="1" noChangeArrowheads="1"/>
-          </p:cNvPicPr>
-          <p:nvPr/>
-        </p:nvPicPr>
-        <p:blipFill>
-          <a:blip r:embed="rId2" cstate="print"/>
-          <a:srcRect/>
-          <a:stretch>
-            <a:fillRect/>
-          </a:stretch>
-        </p:blipFill>
-        <p:spPr bwMode="auto">
-          <a:xfrm>
-            <a:off x="238092" y="214290"/>
-            <a:ext cx="3168650" cy="2593975"/>
-          </a:xfrm>
-          <a:prstGeom prst="rect">
-            <a:avLst/>
-          </a:prstGeom>
-          <a:noFill/>
-          <a:ln w="9525">
-            <a:noFill/>
-            <a:miter lim="800000"/>
-            <a:headEnd/>
-            <a:tailEnd/>
-          </a:ln>
-        </p:spPr>
-      </p:pic>
-      <p:sp>
-        <p:nvSpPr>
-          <p:cNvPr id="1028" name="Rectangle 4"/>
-          <p:cNvSpPr>
-            <a:spLocks noChangeArrowheads="1"/>
-          </p:cNvSpPr>
-          <p:nvPr/>
-        </p:nvSpPr>
-        <p:spPr bwMode="auto">
-          <a:xfrm>
-            <a:off x="0" y="0"/>
-            <a:ext cx="9906000" cy="457200"/>
-          </a:xfrm>
-          <a:prstGeom prst="rect">
-            <a:avLst/>
-          </a:prstGeom>
-          <a:noFill/>
-          <a:ln w="9525">
-            <a:noFill/>
-            <a:miter lim="800000"/>
-            <a:headEnd/>
-            <a:tailEnd/>
-          </a:ln>
-          <a:effectLst/>
-        </p:spPr>
-        <p:txBody>
-          <a:bodyPr vert="horz" wrap="none" lIns="91440" tIns="45720" rIns="91440" bIns="45720" numCol="1" anchor="ctr" anchorCtr="0" compatLnSpc="1">
-            <a:prstTxWarp prst="textNoShape">
-              <a:avLst/>
-            </a:prstTxWarp>
-            <a:spAutoFit/>
-          </a:bodyPr>
-          <a:lstStyle/>
-          <a:p>
-            <a:endParaRPr lang="de-DE"/>
-          </a:p>
-        </p:txBody>
-      </p:sp>
-      <p:sp>
-        <p:nvSpPr>
           <p:cNvPr id="14338" name="AutoShape 2"/>
           <p:cNvSpPr>
             <a:spLocks noChangeArrowheads="1"/>
@@ -6875,249 +6686,6 @@
       </p:grpSpPr>
       <p:sp>
         <p:nvSpPr>
-          <p:cNvPr id="2" name="Titel 1"/>
-          <p:cNvSpPr>
-            <a:spLocks noGrp="1"/>
-          </p:cNvSpPr>
-          <p:nvPr>
-            <p:ph type="ctrTitle"/>
-          </p:nvPr>
-        </p:nvSpPr>
-        <p:spPr>
-          <a:xfrm>
-            <a:off x="2738422" y="785794"/>
-            <a:ext cx="5143536" cy="1470025"/>
-          </a:xfrm>
-        </p:spPr>
-        <p:txBody>
-          <a:bodyPr>
-            <a:normAutofit fontScale="90000"/>
-          </a:bodyPr>
-          <a:lstStyle/>
-          <a:p>
-            <a:r>
-              <a:rPr lang="de-DE" dirty="0"/>
-              <a:t>Java User Group Mannheim</a:t>
-            </a:r>
-            <a:br>
-              <a:rPr lang="de-DE" dirty="0"/>
-            </a:br>
-            <a:endParaRPr lang="de-DE" dirty="0"/>
-          </a:p>
-        </p:txBody>
-      </p:sp>
-      <p:sp>
-        <p:nvSpPr>
-          <p:cNvPr id="3" name="Untertitel 2"/>
-          <p:cNvSpPr>
-            <a:spLocks noGrp="1"/>
-          </p:cNvSpPr>
-          <p:nvPr>
-            <p:ph type="subTitle" idx="4294967295"/>
-          </p:nvPr>
-        </p:nvSpPr>
-        <p:spPr>
-          <a:xfrm>
-            <a:off x="738158" y="3643314"/>
-            <a:ext cx="7072362" cy="2643206"/>
-          </a:xfrm>
-        </p:spPr>
-        <p:txBody>
-          <a:bodyPr>
-            <a:normAutofit/>
-          </a:bodyPr>
-          <a:lstStyle/>
-          <a:p>
-            <a:pPr algn="l">
-              <a:buNone/>
-            </a:pPr>
-            <a:r>
-              <a:rPr lang="de-DE" dirty="0">
-                <a:solidFill>
-                  <a:schemeClr val="tx1"/>
-                </a:solidFill>
-              </a:rPr>
-              <a:t>Vortrag: </a:t>
-            </a:r>
-            <a:br>
-              <a:rPr lang="de-DE" dirty="0">
-                <a:solidFill>
-                  <a:schemeClr val="tx1"/>
-                </a:solidFill>
-              </a:rPr>
-            </a:br>
-            <a:r>
-              <a:rPr lang="de-DE" dirty="0">
-                <a:solidFill>
-                  <a:schemeClr val="tx1"/>
-                </a:solidFill>
-              </a:rPr>
-              <a:t>"Verteiltes Rechnen mit Apache </a:t>
-            </a:r>
-            <a:r>
-              <a:rPr lang="de-DE" dirty="0" err="1">
-                <a:solidFill>
-                  <a:schemeClr val="tx1"/>
-                </a:solidFill>
-              </a:rPr>
-              <a:t>Hadoop</a:t>
-            </a:r>
-            <a:r>
-              <a:rPr lang="de-DE" dirty="0">
-                <a:solidFill>
-                  <a:schemeClr val="tx1"/>
-                </a:solidFill>
-              </a:rPr>
-              <a:t> und </a:t>
-            </a:r>
-            <a:r>
-              <a:rPr lang="de-DE" dirty="0" err="1">
-                <a:solidFill>
-                  <a:schemeClr val="tx1"/>
-                </a:solidFill>
-              </a:rPr>
-              <a:t>Map</a:t>
-            </a:r>
-            <a:r>
-              <a:rPr lang="de-DE" dirty="0">
-                <a:solidFill>
-                  <a:schemeClr val="tx1"/>
-                </a:solidFill>
-              </a:rPr>
-              <a:t>/</a:t>
-            </a:r>
-            <a:r>
-              <a:rPr lang="de-DE" dirty="0" err="1">
-                <a:solidFill>
-                  <a:schemeClr val="tx1"/>
-                </a:solidFill>
-              </a:rPr>
-              <a:t>Reduce</a:t>
-            </a:r>
-            <a:r>
-              <a:rPr lang="de-DE" dirty="0">
-                <a:solidFill>
-                  <a:schemeClr val="tx1"/>
-                </a:solidFill>
-              </a:rPr>
-              <a:t>"</a:t>
-            </a:r>
-          </a:p>
-          <a:p>
-            <a:pPr algn="r">
-              <a:buNone/>
-            </a:pPr>
-            <a:r>
-              <a:rPr lang="de-DE" b="1" dirty="0">
-                <a:solidFill>
-                  <a:schemeClr val="tx1"/>
-                </a:solidFill>
-              </a:rPr>
-              <a:t>A5, Raum </a:t>
-            </a:r>
-            <a:r>
-              <a:rPr lang="de-DE" b="1" dirty="0" smtClean="0">
-                <a:solidFill>
-                  <a:schemeClr val="tx1"/>
-                </a:solidFill>
-              </a:rPr>
-              <a:t>C013</a:t>
-            </a:r>
-            <a:r>
-              <a:rPr lang="de-DE" b="1" dirty="0" smtClean="0">
-                <a:solidFill>
-                  <a:schemeClr val="tx1"/>
-                </a:solidFill>
-              </a:rPr>
-              <a:t>, 19 Uhr</a:t>
-            </a:r>
-            <a:endParaRPr lang="de-DE" dirty="0">
-              <a:solidFill>
-                <a:schemeClr val="tx1"/>
-              </a:solidFill>
-            </a:endParaRPr>
-          </a:p>
-          <a:p>
-            <a:endParaRPr lang="de-DE" dirty="0">
-              <a:solidFill>
-                <a:schemeClr val="tx1"/>
-              </a:solidFill>
-            </a:endParaRPr>
-          </a:p>
-        </p:txBody>
-      </p:sp>
-      <p:pic>
-        <p:nvPicPr>
-          <p:cNvPr id="1026" name="Bild 4"/>
-          <p:cNvPicPr>
-            <a:picLocks noChangeAspect="1" noChangeArrowheads="1"/>
-          </p:cNvPicPr>
-          <p:nvPr/>
-        </p:nvPicPr>
-        <p:blipFill>
-          <a:blip r:embed="rId2" cstate="print"/>
-          <a:srcRect/>
-          <a:stretch>
-            <a:fillRect/>
-          </a:stretch>
-        </p:blipFill>
-        <p:spPr bwMode="auto">
-          <a:xfrm>
-            <a:off x="238092" y="214290"/>
-            <a:ext cx="3168650" cy="2593975"/>
-          </a:xfrm>
-          <a:prstGeom prst="rect">
-            <a:avLst/>
-          </a:prstGeom>
-          <a:noFill/>
-          <a:ln w="9525">
-            <a:noFill/>
-            <a:miter lim="800000"/>
-            <a:headEnd/>
-            <a:tailEnd/>
-          </a:ln>
-        </p:spPr>
-      </p:pic>
-      <p:sp>
-        <p:nvSpPr>
-          <p:cNvPr id="1028" name="Rectangle 4"/>
-          <p:cNvSpPr>
-            <a:spLocks noChangeArrowheads="1"/>
-          </p:cNvSpPr>
-          <p:nvPr/>
-        </p:nvSpPr>
-        <p:spPr bwMode="auto">
-          <a:xfrm>
-            <a:off x="0" y="0"/>
-            <a:ext cx="9906000" cy="457200"/>
-          </a:xfrm>
-          <a:prstGeom prst="rect">
-            <a:avLst/>
-          </a:prstGeom>
-          <a:noFill/>
-          <a:ln w="9525">
-            <a:noFill/>
-            <a:miter lim="800000"/>
-            <a:headEnd/>
-            <a:tailEnd/>
-          </a:ln>
-          <a:effectLst/>
-        </p:spPr>
-        <p:txBody>
-          <a:bodyPr vert="horz" wrap="none" lIns="91440" tIns="45720" rIns="91440" bIns="45720" numCol="1" anchor="ctr" anchorCtr="0" compatLnSpc="1">
-            <a:prstTxWarp prst="textNoShape">
-              <a:avLst/>
-            </a:prstTxWarp>
-            <a:spAutoFit/>
-          </a:bodyPr>
-          <a:lstStyle/>
-          <a:p>
-            <a:endParaRPr lang="de-DE"/>
-          </a:p>
-        </p:txBody>
-      </p:sp>
-      <p:sp>
-        <p:nvSpPr>
           <p:cNvPr id="15362" name="AutoShape 2"/>
           <p:cNvSpPr>
             <a:spLocks noChangeArrowheads="1"/>
@@ -7186,249 +6754,6 @@
       </p:grpSpPr>
       <p:sp>
         <p:nvSpPr>
-          <p:cNvPr id="2" name="Titel 1"/>
-          <p:cNvSpPr>
-            <a:spLocks noGrp="1"/>
-          </p:cNvSpPr>
-          <p:nvPr>
-            <p:ph type="ctrTitle"/>
-          </p:nvPr>
-        </p:nvSpPr>
-        <p:spPr>
-          <a:xfrm>
-            <a:off x="2738422" y="785794"/>
-            <a:ext cx="5143536" cy="1470025"/>
-          </a:xfrm>
-        </p:spPr>
-        <p:txBody>
-          <a:bodyPr>
-            <a:normAutofit fontScale="90000"/>
-          </a:bodyPr>
-          <a:lstStyle/>
-          <a:p>
-            <a:r>
-              <a:rPr lang="de-DE" dirty="0"/>
-              <a:t>Java User Group Mannheim</a:t>
-            </a:r>
-            <a:br>
-              <a:rPr lang="de-DE" dirty="0"/>
-            </a:br>
-            <a:endParaRPr lang="de-DE" dirty="0"/>
-          </a:p>
-        </p:txBody>
-      </p:sp>
-      <p:sp>
-        <p:nvSpPr>
-          <p:cNvPr id="3" name="Untertitel 2"/>
-          <p:cNvSpPr>
-            <a:spLocks noGrp="1"/>
-          </p:cNvSpPr>
-          <p:nvPr>
-            <p:ph type="subTitle" idx="4294967295"/>
-          </p:nvPr>
-        </p:nvSpPr>
-        <p:spPr>
-          <a:xfrm>
-            <a:off x="738158" y="3643314"/>
-            <a:ext cx="7072362" cy="2643206"/>
-          </a:xfrm>
-        </p:spPr>
-        <p:txBody>
-          <a:bodyPr>
-            <a:normAutofit/>
-          </a:bodyPr>
-          <a:lstStyle/>
-          <a:p>
-            <a:pPr algn="l">
-              <a:buNone/>
-            </a:pPr>
-            <a:r>
-              <a:rPr lang="de-DE" dirty="0">
-                <a:solidFill>
-                  <a:schemeClr val="tx1"/>
-                </a:solidFill>
-              </a:rPr>
-              <a:t>Vortrag: </a:t>
-            </a:r>
-            <a:br>
-              <a:rPr lang="de-DE" dirty="0">
-                <a:solidFill>
-                  <a:schemeClr val="tx1"/>
-                </a:solidFill>
-              </a:rPr>
-            </a:br>
-            <a:r>
-              <a:rPr lang="de-DE" dirty="0">
-                <a:solidFill>
-                  <a:schemeClr val="tx1"/>
-                </a:solidFill>
-              </a:rPr>
-              <a:t>"Verteiltes Rechnen mit Apache </a:t>
-            </a:r>
-            <a:r>
-              <a:rPr lang="de-DE" dirty="0" err="1">
-                <a:solidFill>
-                  <a:schemeClr val="tx1"/>
-                </a:solidFill>
-              </a:rPr>
-              <a:t>Hadoop</a:t>
-            </a:r>
-            <a:r>
-              <a:rPr lang="de-DE" dirty="0">
-                <a:solidFill>
-                  <a:schemeClr val="tx1"/>
-                </a:solidFill>
-              </a:rPr>
-              <a:t> und </a:t>
-            </a:r>
-            <a:r>
-              <a:rPr lang="de-DE" dirty="0" err="1">
-                <a:solidFill>
-                  <a:schemeClr val="tx1"/>
-                </a:solidFill>
-              </a:rPr>
-              <a:t>Map</a:t>
-            </a:r>
-            <a:r>
-              <a:rPr lang="de-DE" dirty="0">
-                <a:solidFill>
-                  <a:schemeClr val="tx1"/>
-                </a:solidFill>
-              </a:rPr>
-              <a:t>/</a:t>
-            </a:r>
-            <a:r>
-              <a:rPr lang="de-DE" dirty="0" err="1">
-                <a:solidFill>
-                  <a:schemeClr val="tx1"/>
-                </a:solidFill>
-              </a:rPr>
-              <a:t>Reduce</a:t>
-            </a:r>
-            <a:r>
-              <a:rPr lang="de-DE" dirty="0">
-                <a:solidFill>
-                  <a:schemeClr val="tx1"/>
-                </a:solidFill>
-              </a:rPr>
-              <a:t>"</a:t>
-            </a:r>
-          </a:p>
-          <a:p>
-            <a:pPr algn="r">
-              <a:buNone/>
-            </a:pPr>
-            <a:r>
-              <a:rPr lang="de-DE" b="1" dirty="0">
-                <a:solidFill>
-                  <a:schemeClr val="tx1"/>
-                </a:solidFill>
-              </a:rPr>
-              <a:t>A5, Raum </a:t>
-            </a:r>
-            <a:r>
-              <a:rPr lang="de-DE" b="1" dirty="0" smtClean="0">
-                <a:solidFill>
-                  <a:schemeClr val="tx1"/>
-                </a:solidFill>
-              </a:rPr>
-              <a:t>C013</a:t>
-            </a:r>
-            <a:r>
-              <a:rPr lang="de-DE" b="1" dirty="0" smtClean="0">
-                <a:solidFill>
-                  <a:schemeClr val="tx1"/>
-                </a:solidFill>
-              </a:rPr>
-              <a:t>, 19 Uhr</a:t>
-            </a:r>
-            <a:endParaRPr lang="de-DE" dirty="0">
-              <a:solidFill>
-                <a:schemeClr val="tx1"/>
-              </a:solidFill>
-            </a:endParaRPr>
-          </a:p>
-          <a:p>
-            <a:endParaRPr lang="de-DE" dirty="0">
-              <a:solidFill>
-                <a:schemeClr val="tx1"/>
-              </a:solidFill>
-            </a:endParaRPr>
-          </a:p>
-        </p:txBody>
-      </p:sp>
-      <p:pic>
-        <p:nvPicPr>
-          <p:cNvPr id="1026" name="Bild 4"/>
-          <p:cNvPicPr>
-            <a:picLocks noChangeAspect="1" noChangeArrowheads="1"/>
-          </p:cNvPicPr>
-          <p:nvPr/>
-        </p:nvPicPr>
-        <p:blipFill>
-          <a:blip r:embed="rId2" cstate="print"/>
-          <a:srcRect/>
-          <a:stretch>
-            <a:fillRect/>
-          </a:stretch>
-        </p:blipFill>
-        <p:spPr bwMode="auto">
-          <a:xfrm>
-            <a:off x="238092" y="214290"/>
-            <a:ext cx="3168650" cy="2593975"/>
-          </a:xfrm>
-          <a:prstGeom prst="rect">
-            <a:avLst/>
-          </a:prstGeom>
-          <a:noFill/>
-          <a:ln w="9525">
-            <a:noFill/>
-            <a:miter lim="800000"/>
-            <a:headEnd/>
-            <a:tailEnd/>
-          </a:ln>
-        </p:spPr>
-      </p:pic>
-      <p:sp>
-        <p:nvSpPr>
-          <p:cNvPr id="1028" name="Rectangle 4"/>
-          <p:cNvSpPr>
-            <a:spLocks noChangeArrowheads="1"/>
-          </p:cNvSpPr>
-          <p:nvPr/>
-        </p:nvSpPr>
-        <p:spPr bwMode="auto">
-          <a:xfrm>
-            <a:off x="0" y="0"/>
-            <a:ext cx="9906000" cy="457200"/>
-          </a:xfrm>
-          <a:prstGeom prst="rect">
-            <a:avLst/>
-          </a:prstGeom>
-          <a:noFill/>
-          <a:ln w="9525">
-            <a:noFill/>
-            <a:miter lim="800000"/>
-            <a:headEnd/>
-            <a:tailEnd/>
-          </a:ln>
-          <a:effectLst/>
-        </p:spPr>
-        <p:txBody>
-          <a:bodyPr vert="horz" wrap="none" lIns="91440" tIns="45720" rIns="91440" bIns="45720" numCol="1" anchor="ctr" anchorCtr="0" compatLnSpc="1">
-            <a:prstTxWarp prst="textNoShape">
-              <a:avLst/>
-            </a:prstTxWarp>
-            <a:spAutoFit/>
-          </a:bodyPr>
-          <a:lstStyle/>
-          <a:p>
-            <a:endParaRPr lang="de-DE"/>
-          </a:p>
-        </p:txBody>
-      </p:sp>
-      <p:sp>
-        <p:nvSpPr>
           <p:cNvPr id="16386" name="AutoShape 2"/>
           <p:cNvSpPr>
             <a:spLocks noChangeArrowheads="1"/>
@@ -7495,249 +6820,6 @@
           <a:chExt cx="0" cy="0"/>
         </a:xfrm>
       </p:grpSpPr>
-      <p:sp>
-        <p:nvSpPr>
-          <p:cNvPr id="2" name="Titel 1"/>
-          <p:cNvSpPr>
-            <a:spLocks noGrp="1"/>
-          </p:cNvSpPr>
-          <p:nvPr>
-            <p:ph type="ctrTitle"/>
-          </p:nvPr>
-        </p:nvSpPr>
-        <p:spPr>
-          <a:xfrm>
-            <a:off x="2738422" y="785794"/>
-            <a:ext cx="5143536" cy="1470025"/>
-          </a:xfrm>
-        </p:spPr>
-        <p:txBody>
-          <a:bodyPr>
-            <a:normAutofit fontScale="90000"/>
-          </a:bodyPr>
-          <a:lstStyle/>
-          <a:p>
-            <a:r>
-              <a:rPr lang="de-DE" dirty="0"/>
-              <a:t>Java User Group Mannheim</a:t>
-            </a:r>
-            <a:br>
-              <a:rPr lang="de-DE" dirty="0"/>
-            </a:br>
-            <a:endParaRPr lang="de-DE" dirty="0"/>
-          </a:p>
-        </p:txBody>
-      </p:sp>
-      <p:sp>
-        <p:nvSpPr>
-          <p:cNvPr id="3" name="Untertitel 2"/>
-          <p:cNvSpPr>
-            <a:spLocks noGrp="1"/>
-          </p:cNvSpPr>
-          <p:nvPr>
-            <p:ph type="subTitle" idx="4294967295"/>
-          </p:nvPr>
-        </p:nvSpPr>
-        <p:spPr>
-          <a:xfrm>
-            <a:off x="738158" y="3643314"/>
-            <a:ext cx="7072362" cy="2643206"/>
-          </a:xfrm>
-        </p:spPr>
-        <p:txBody>
-          <a:bodyPr>
-            <a:normAutofit/>
-          </a:bodyPr>
-          <a:lstStyle/>
-          <a:p>
-            <a:pPr algn="l">
-              <a:buNone/>
-            </a:pPr>
-            <a:r>
-              <a:rPr lang="de-DE" dirty="0">
-                <a:solidFill>
-                  <a:schemeClr val="tx1"/>
-                </a:solidFill>
-              </a:rPr>
-              <a:t>Vortrag: </a:t>
-            </a:r>
-            <a:br>
-              <a:rPr lang="de-DE" dirty="0">
-                <a:solidFill>
-                  <a:schemeClr val="tx1"/>
-                </a:solidFill>
-              </a:rPr>
-            </a:br>
-            <a:r>
-              <a:rPr lang="de-DE" dirty="0">
-                <a:solidFill>
-                  <a:schemeClr val="tx1"/>
-                </a:solidFill>
-              </a:rPr>
-              <a:t>"Verteiltes Rechnen mit Apache </a:t>
-            </a:r>
-            <a:r>
-              <a:rPr lang="de-DE" dirty="0" err="1">
-                <a:solidFill>
-                  <a:schemeClr val="tx1"/>
-                </a:solidFill>
-              </a:rPr>
-              <a:t>Hadoop</a:t>
-            </a:r>
-            <a:r>
-              <a:rPr lang="de-DE" dirty="0">
-                <a:solidFill>
-                  <a:schemeClr val="tx1"/>
-                </a:solidFill>
-              </a:rPr>
-              <a:t> und </a:t>
-            </a:r>
-            <a:r>
-              <a:rPr lang="de-DE" dirty="0" err="1">
-                <a:solidFill>
-                  <a:schemeClr val="tx1"/>
-                </a:solidFill>
-              </a:rPr>
-              <a:t>Map</a:t>
-            </a:r>
-            <a:r>
-              <a:rPr lang="de-DE" dirty="0">
-                <a:solidFill>
-                  <a:schemeClr val="tx1"/>
-                </a:solidFill>
-              </a:rPr>
-              <a:t>/</a:t>
-            </a:r>
-            <a:r>
-              <a:rPr lang="de-DE" dirty="0" err="1">
-                <a:solidFill>
-                  <a:schemeClr val="tx1"/>
-                </a:solidFill>
-              </a:rPr>
-              <a:t>Reduce</a:t>
-            </a:r>
-            <a:r>
-              <a:rPr lang="de-DE" dirty="0">
-                <a:solidFill>
-                  <a:schemeClr val="tx1"/>
-                </a:solidFill>
-              </a:rPr>
-              <a:t>"</a:t>
-            </a:r>
-          </a:p>
-          <a:p>
-            <a:pPr algn="r">
-              <a:buNone/>
-            </a:pPr>
-            <a:r>
-              <a:rPr lang="de-DE" b="1" dirty="0">
-                <a:solidFill>
-                  <a:schemeClr val="tx1"/>
-                </a:solidFill>
-              </a:rPr>
-              <a:t>A5, Raum </a:t>
-            </a:r>
-            <a:r>
-              <a:rPr lang="de-DE" b="1" dirty="0" smtClean="0">
-                <a:solidFill>
-                  <a:schemeClr val="tx1"/>
-                </a:solidFill>
-              </a:rPr>
-              <a:t>C013</a:t>
-            </a:r>
-            <a:r>
-              <a:rPr lang="de-DE" b="1" dirty="0" smtClean="0">
-                <a:solidFill>
-                  <a:schemeClr val="tx1"/>
-                </a:solidFill>
-              </a:rPr>
-              <a:t>, 19 Uhr</a:t>
-            </a:r>
-            <a:endParaRPr lang="de-DE" dirty="0">
-              <a:solidFill>
-                <a:schemeClr val="tx1"/>
-              </a:solidFill>
-            </a:endParaRPr>
-          </a:p>
-          <a:p>
-            <a:endParaRPr lang="de-DE" dirty="0">
-              <a:solidFill>
-                <a:schemeClr val="tx1"/>
-              </a:solidFill>
-            </a:endParaRPr>
-          </a:p>
-        </p:txBody>
-      </p:sp>
-      <p:pic>
-        <p:nvPicPr>
-          <p:cNvPr id="1026" name="Bild 4"/>
-          <p:cNvPicPr>
-            <a:picLocks noChangeAspect="1" noChangeArrowheads="1"/>
-          </p:cNvPicPr>
-          <p:nvPr/>
-        </p:nvPicPr>
-        <p:blipFill>
-          <a:blip r:embed="rId2" cstate="print"/>
-          <a:srcRect/>
-          <a:stretch>
-            <a:fillRect/>
-          </a:stretch>
-        </p:blipFill>
-        <p:spPr bwMode="auto">
-          <a:xfrm>
-            <a:off x="238092" y="214290"/>
-            <a:ext cx="3168650" cy="2593975"/>
-          </a:xfrm>
-          <a:prstGeom prst="rect">
-            <a:avLst/>
-          </a:prstGeom>
-          <a:noFill/>
-          <a:ln w="9525">
-            <a:noFill/>
-            <a:miter lim="800000"/>
-            <a:headEnd/>
-            <a:tailEnd/>
-          </a:ln>
-        </p:spPr>
-      </p:pic>
-      <p:sp>
-        <p:nvSpPr>
-          <p:cNvPr id="1028" name="Rectangle 4"/>
-          <p:cNvSpPr>
-            <a:spLocks noChangeArrowheads="1"/>
-          </p:cNvSpPr>
-          <p:nvPr/>
-        </p:nvSpPr>
-        <p:spPr bwMode="auto">
-          <a:xfrm>
-            <a:off x="0" y="0"/>
-            <a:ext cx="9906000" cy="457200"/>
-          </a:xfrm>
-          <a:prstGeom prst="rect">
-            <a:avLst/>
-          </a:prstGeom>
-          <a:noFill/>
-          <a:ln w="9525">
-            <a:noFill/>
-            <a:miter lim="800000"/>
-            <a:headEnd/>
-            <a:tailEnd/>
-          </a:ln>
-          <a:effectLst/>
-        </p:spPr>
-        <p:txBody>
-          <a:bodyPr vert="horz" wrap="none" lIns="91440" tIns="45720" rIns="91440" bIns="45720" numCol="1" anchor="ctr" anchorCtr="0" compatLnSpc="1">
-            <a:prstTxWarp prst="textNoShape">
-              <a:avLst/>
-            </a:prstTxWarp>
-            <a:spAutoFit/>
-          </a:bodyPr>
-          <a:lstStyle/>
-          <a:p>
-            <a:endParaRPr lang="de-DE"/>
-          </a:p>
-        </p:txBody>
-      </p:sp>
       <p:sp>
         <p:nvSpPr>
           <p:cNvPr id="17410" name="AutoShape 2"/>
@@ -7888,257 +6970,6 @@
           <a:chExt cx="0" cy="0"/>
         </a:xfrm>
       </p:grpSpPr>
-      <p:sp>
-        <p:nvSpPr>
-          <p:cNvPr id="2" name="Titel 1"/>
-          <p:cNvSpPr>
-            <a:spLocks noGrp="1"/>
-          </p:cNvSpPr>
-          <p:nvPr>
-            <p:ph type="ctrTitle"/>
-          </p:nvPr>
-        </p:nvSpPr>
-        <p:spPr>
-          <a:xfrm>
-            <a:off x="2738422" y="785794"/>
-            <a:ext cx="5143536" cy="1470025"/>
-          </a:xfrm>
-        </p:spPr>
-        <p:txBody>
-          <a:bodyPr>
-            <a:normAutofit fontScale="90000"/>
-          </a:bodyPr>
-          <a:lstStyle/>
-          <a:p>
-            <a:r>
-              <a:rPr lang="de-DE" dirty="0"/>
-              <a:t>Java User Group Mannheim</a:t>
-            </a:r>
-            <a:br>
-              <a:rPr lang="de-DE" dirty="0"/>
-            </a:br>
-            <a:endParaRPr lang="de-DE" dirty="0"/>
-          </a:p>
-        </p:txBody>
-      </p:sp>
-      <p:sp>
-        <p:nvSpPr>
-          <p:cNvPr id="3" name="Untertitel 2"/>
-          <p:cNvSpPr>
-            <a:spLocks noGrp="1"/>
-          </p:cNvSpPr>
-          <p:nvPr>
-            <p:ph type="subTitle" idx="4294967295"/>
-          </p:nvPr>
-        </p:nvSpPr>
-        <p:spPr>
-          <a:xfrm>
-            <a:off x="738158" y="3643314"/>
-            <a:ext cx="7072362" cy="2643206"/>
-          </a:xfrm>
-        </p:spPr>
-        <p:txBody>
-          <a:bodyPr>
-            <a:normAutofit/>
-          </a:bodyPr>
-          <a:lstStyle/>
-          <a:p>
-            <a:pPr algn="l">
-              <a:buNone/>
-            </a:pPr>
-            <a:r>
-              <a:rPr lang="de-DE" dirty="0">
-                <a:solidFill>
-                  <a:schemeClr val="tx1"/>
-                </a:solidFill>
-              </a:rPr>
-              <a:t>Vortrag: </a:t>
-            </a:r>
-            <a:br>
-              <a:rPr lang="de-DE" dirty="0">
-                <a:solidFill>
-                  <a:schemeClr val="tx1"/>
-                </a:solidFill>
-              </a:rPr>
-            </a:br>
-            <a:r>
-              <a:rPr lang="de-DE" dirty="0">
-                <a:solidFill>
-                  <a:schemeClr val="tx1"/>
-                </a:solidFill>
-              </a:rPr>
-              <a:t>"Verteiltes Rechnen mit Apache </a:t>
-            </a:r>
-            <a:r>
-              <a:rPr lang="de-DE" dirty="0" err="1">
-                <a:solidFill>
-                  <a:schemeClr val="tx1"/>
-                </a:solidFill>
-              </a:rPr>
-              <a:t>Hadoop</a:t>
-            </a:r>
-            <a:r>
-              <a:rPr lang="de-DE" dirty="0">
-                <a:solidFill>
-                  <a:schemeClr val="tx1"/>
-                </a:solidFill>
-              </a:rPr>
-              <a:t> und </a:t>
-            </a:r>
-            <a:r>
-              <a:rPr lang="de-DE" dirty="0" err="1">
-                <a:solidFill>
-                  <a:schemeClr val="tx1"/>
-                </a:solidFill>
-              </a:rPr>
-              <a:t>Map</a:t>
-            </a:r>
-            <a:r>
-              <a:rPr lang="de-DE" dirty="0">
-                <a:solidFill>
-                  <a:schemeClr val="tx1"/>
-                </a:solidFill>
-              </a:rPr>
-              <a:t>/</a:t>
-            </a:r>
-            <a:r>
-              <a:rPr lang="de-DE" dirty="0" err="1">
-                <a:solidFill>
-                  <a:schemeClr val="tx1"/>
-                </a:solidFill>
-              </a:rPr>
-              <a:t>Reduce</a:t>
-            </a:r>
-            <a:r>
-              <a:rPr lang="de-DE" dirty="0">
-                <a:solidFill>
-                  <a:schemeClr val="tx1"/>
-                </a:solidFill>
-              </a:rPr>
-              <a:t>"</a:t>
-            </a:r>
-          </a:p>
-          <a:p>
-            <a:pPr algn="r">
-              <a:buNone/>
-            </a:pPr>
-            <a:r>
-              <a:rPr lang="de-DE" b="1" dirty="0" smtClean="0">
-                <a:solidFill>
-                  <a:schemeClr val="tx1"/>
-                </a:solidFill>
-              </a:rPr>
-              <a:t>A5</a:t>
-            </a:r>
-            <a:r>
-              <a:rPr lang="de-DE" b="1" dirty="0">
-                <a:solidFill>
-                  <a:schemeClr val="tx1"/>
-                </a:solidFill>
-              </a:rPr>
-              <a:t>, Raum </a:t>
-            </a:r>
-            <a:r>
-              <a:rPr lang="de-DE" b="1" dirty="0" smtClean="0">
-                <a:solidFill>
-                  <a:schemeClr val="tx1"/>
-                </a:solidFill>
-              </a:rPr>
-              <a:t>C013, </a:t>
-            </a:r>
-            <a:r>
-              <a:rPr lang="de-DE" b="1" dirty="0" smtClean="0">
-                <a:solidFill>
-                  <a:schemeClr val="tx1"/>
-                </a:solidFill>
-              </a:rPr>
-              <a:t>19 Uhr</a:t>
-            </a:r>
-            <a:endParaRPr lang="de-DE" dirty="0">
-              <a:solidFill>
-                <a:schemeClr val="tx1"/>
-              </a:solidFill>
-            </a:endParaRPr>
-          </a:p>
-          <a:p>
-            <a:endParaRPr lang="de-DE" dirty="0">
-              <a:solidFill>
-                <a:schemeClr val="tx1"/>
-              </a:solidFill>
-            </a:endParaRPr>
-          </a:p>
-        </p:txBody>
-      </p:sp>
-      <p:pic>
-        <p:nvPicPr>
-          <p:cNvPr id="1026" name="Bild 4"/>
-          <p:cNvPicPr>
-            <a:picLocks noChangeAspect="1" noChangeArrowheads="1"/>
-          </p:cNvPicPr>
-          <p:nvPr/>
-        </p:nvPicPr>
-        <p:blipFill>
-          <a:blip r:embed="rId2" cstate="print"/>
-          <a:srcRect/>
-          <a:stretch>
-            <a:fillRect/>
-          </a:stretch>
-        </p:blipFill>
-        <p:spPr bwMode="auto">
-          <a:xfrm>
-            <a:off x="238092" y="214290"/>
-            <a:ext cx="3168650" cy="2593975"/>
-          </a:xfrm>
-          <a:prstGeom prst="rect">
-            <a:avLst/>
-          </a:prstGeom>
-          <a:noFill/>
-          <a:ln w="9525">
-            <a:noFill/>
-            <a:miter lim="800000"/>
-            <a:headEnd/>
-            <a:tailEnd/>
-          </a:ln>
-        </p:spPr>
-      </p:pic>
-      <p:sp>
-        <p:nvSpPr>
-          <p:cNvPr id="1028" name="Rectangle 4"/>
-          <p:cNvSpPr>
-            <a:spLocks noChangeArrowheads="1"/>
-          </p:cNvSpPr>
-          <p:nvPr/>
-        </p:nvSpPr>
-        <p:spPr bwMode="auto">
-          <a:xfrm>
-            <a:off x="0" y="0"/>
-            <a:ext cx="9906000" cy="457200"/>
-          </a:xfrm>
-          <a:prstGeom prst="rect">
-            <a:avLst/>
-          </a:prstGeom>
-          <a:noFill/>
-          <a:ln w="9525">
-            <a:noFill/>
-            <a:miter lim="800000"/>
-            <a:headEnd/>
-            <a:tailEnd/>
-          </a:ln>
-          <a:effectLst/>
-        </p:spPr>
-        <p:txBody>
-          <a:bodyPr vert="horz" wrap="none" lIns="91440" tIns="45720" rIns="91440" bIns="45720" numCol="1" anchor="ctr" anchorCtr="0" compatLnSpc="1">
-            <a:prstTxWarp prst="textNoShape">
-              <a:avLst/>
-            </a:prstTxWarp>
-            <a:spAutoFit/>
-          </a:bodyPr>
-          <a:lstStyle/>
-          <a:p>
-            <a:endParaRPr lang="de-DE"/>
-          </a:p>
-        </p:txBody>
-      </p:sp>
       <p:sp>
         <p:nvSpPr>
           <p:cNvPr id="18434" name="AutoShape 2"/>

</xml_diff>